<commit_message>
Add Virtual Currency System
- Implementation of virtual currency
  storage and use system in Playfab
  server

- Photon Room Data Update

- Add and delete resource data
</commit_message>
<xml_diff>
--- a/Assets/Class/Photon Server/PPT Data/Photon Room.pptx
+++ b/Assets/Class/Photon Server/PPT Data/Photon Room.pptx
@@ -2,25 +2,25 @@
 <file path=ppt/presentation.xml><?xml version="1.0" encoding="utf-8"?>
 <p:presentation xmlns:a="http://schemas.openxmlformats.org/drawingml/2006/main" xmlns:r="http://schemas.openxmlformats.org/officeDocument/2006/relationships" xmlns:p="http://schemas.openxmlformats.org/presentationml/2006/main" xmlns:p14="http://schemas.microsoft.com/office/powerpoint/2010/main" saveSubsetFonts="1" firstSlideNum="0">
   <p:sldMasterIdLst>
-    <p:sldMasterId id="2147486829" r:id="rId12"/>
+    <p:sldMasterId id="2147486852" r:id="rId12"/>
   </p:sldMasterIdLst>
   <p:notesMasterIdLst>
     <p:notesMasterId r:id="rId14"/>
   </p:notesMasterIdLst>
   <p:sldIdLst>
     <p:sldId id="312" r:id="rId16"/>
-    <p:sldId id="314" r:id="rId18"/>
-    <p:sldId id="315" r:id="rId20"/>
-    <p:sldId id="316" r:id="rId22"/>
-    <p:sldId id="317" r:id="rId24"/>
-    <p:sldId id="318" r:id="rId26"/>
-    <p:sldId id="319" r:id="rId28"/>
-    <p:sldId id="320" r:id="rId30"/>
-    <p:sldId id="321" r:id="rId32"/>
-    <p:sldId id="322" r:id="rId34"/>
-    <p:sldId id="323" r:id="rId36"/>
-    <p:sldId id="324" r:id="rId37"/>
-    <p:sldId id="325" r:id="rId39"/>
+    <p:sldId id="314" r:id="rId17"/>
+    <p:sldId id="315" r:id="rId18"/>
+    <p:sldId id="316" r:id="rId19"/>
+    <p:sldId id="317" r:id="rId20"/>
+    <p:sldId id="318" r:id="rId21"/>
+    <p:sldId id="319" r:id="rId22"/>
+    <p:sldId id="320" r:id="rId23"/>
+    <p:sldId id="321" r:id="rId24"/>
+    <p:sldId id="322" r:id="rId25"/>
+    <p:sldId id="323" r:id="rId27"/>
+    <p:sldId id="324" r:id="rId29"/>
+    <p:sldId id="325" r:id="rId31"/>
   </p:sldIdLst>
   <p:sldSz cx="12192000" cy="6858000"/>
   <p:notesSz cx="6858000" cy="9144000"/>
@@ -7288,8 +7288,8 @@
         </p:nvSpPr>
         <p:spPr>
           <a:xfrm rot="0">
-            <a:off x="1221740" y="5090160"/>
-            <a:ext cx="3958590" cy="954405"/>
+            <a:off x="1222375" y="5231765"/>
+            <a:ext cx="4164965" cy="954405"/>
           </a:xfrm>
           <a:prstGeom prst="rect"/>
           <a:noFill/>
@@ -7369,7 +7369,7 @@
       </p:sp>
       <p:pic>
         <p:nvPicPr>
-          <p:cNvPr id="25" name="그림 2"/>
+          <p:cNvPr id="25" name="그림 2" descr="C:/Users/Admin1/AppData/Roaming/PolarisOffice/ETemp/20796_18072784/fImage1850015041.png"/>
           <p:cNvPicPr>
             <a:picLocks noChangeAspect="1"/>
           </p:cNvPicPr>
@@ -7389,8 +7389,8 @@
         </p:blipFill>
         <p:spPr>
           <a:xfrm rot="0">
-            <a:off x="1220470" y="1280160"/>
-            <a:ext cx="2679700" cy="3616960"/>
+            <a:off x="1220470" y="1363345"/>
+            <a:ext cx="2787015" cy="3616960"/>
           </a:xfrm>
           <a:prstGeom prst="roundRect"/>
           <a:solidFill>
@@ -7400,17 +7400,17 @@
       </p:pic>
       <p:pic>
         <p:nvPicPr>
-          <p:cNvPr id="26" name="그림 3"/>
+          <p:cNvPr id="26" name="그림 3" descr="C:/Users/Admin1/AppData/Roaming/PolarisOffice/ETemp/20796_18072784/fImage53011518467.png"/>
           <p:cNvPicPr>
             <a:picLocks noChangeAspect="1"/>
           </p:cNvPicPr>
           <p:nvPr/>
         </p:nvPicPr>
         <p:blipFill rotWithShape="1">
-          <a:blip r:embed="rId7" cstate="print">
+          <a:blip r:embed="rId7" cstate="hqprint">
             <a:extLst>
               <a:ext uri="{28A0092B-C50C-407E-A947-70E740481C1C}">
-                <a14:useLocalDpi xmlns:a14="http://schemas.microsoft.com/office/drawing/2010/main" val="0"/>
+                <a14:useLocalDpi xmlns:a14="http://schemas.microsoft.com/office/drawing/2010/main"/>
               </a:ext>
             </a:extLst>
           </a:blip>
@@ -7420,8 +7420,8 @@
         </p:blipFill>
         <p:spPr>
           <a:xfrm rot="0">
-            <a:off x="4184015" y="1911985"/>
-            <a:ext cx="1195070" cy="2345055"/>
+            <a:off x="4192270" y="2136140"/>
+            <a:ext cx="1186815" cy="2054225"/>
           </a:xfrm>
           <a:prstGeom prst="roundRect"/>
           <a:solidFill>
@@ -7439,8 +7439,8 @@
         </p:nvSpPr>
         <p:spPr>
           <a:xfrm rot="0">
-            <a:off x="6808470" y="3982085"/>
-            <a:ext cx="4123690" cy="2061845"/>
+            <a:off x="6808470" y="4114800"/>
+            <a:ext cx="4124325" cy="2062480"/>
           </a:xfrm>
           <a:prstGeom prst="rect"/>
           <a:noFill/>
@@ -7522,17 +7522,17 @@
       </p:sp>
       <p:pic>
         <p:nvPicPr>
-          <p:cNvPr id="29" name="그림 18"/>
+          <p:cNvPr id="29" name="그림 18" descr="C:/Users/Admin1/AppData/Roaming/PolarisOffice/ETemp/20796_18072784/fImage62891696334.png"/>
           <p:cNvPicPr>
             <a:picLocks noChangeAspect="1"/>
           </p:cNvPicPr>
           <p:nvPr/>
         </p:nvPicPr>
         <p:blipFill rotWithShape="1">
-          <a:blip r:embed="rId8" cstate="print">
+          <a:blip r:embed="rId8" cstate="hqprint">
             <a:extLst>
               <a:ext uri="{28A0092B-C50C-407E-A947-70E740481C1C}">
-                <a14:useLocalDpi xmlns:a14="http://schemas.microsoft.com/office/drawing/2010/main" val="0"/>
+                <a14:useLocalDpi xmlns:a14="http://schemas.microsoft.com/office/drawing/2010/main"/>
               </a:ext>
             </a:extLst>
           </a:blip>
@@ -7542,8 +7542,8 @@
         </p:blipFill>
         <p:spPr>
           <a:xfrm rot="0">
-            <a:off x="9564370" y="1188085"/>
-            <a:ext cx="1367790" cy="1423035"/>
+            <a:off x="9601835" y="1371600"/>
+            <a:ext cx="1330960" cy="1505585"/>
           </a:xfrm>
           <a:prstGeom prst="roundRect"/>
           <a:solidFill>
@@ -7553,7 +7553,7 @@
       </p:pic>
       <p:pic>
         <p:nvPicPr>
-          <p:cNvPr id="30" name="그림 22"/>
+          <p:cNvPr id="30" name="그림 22" descr="C:/Users/Admin1/AppData/Roaming/PolarisOffice/ETemp/20796_18072784/fImage330251726500.png"/>
           <p:cNvPicPr>
             <a:picLocks noChangeAspect="1"/>
           </p:cNvPicPr>
@@ -7573,8 +7573,8 @@
         </p:blipFill>
         <p:spPr>
           <a:xfrm rot="0">
-            <a:off x="6816725" y="1188720"/>
-            <a:ext cx="2578100" cy="2694305"/>
+            <a:off x="6816725" y="1371600"/>
+            <a:ext cx="2578735" cy="2512060"/>
           </a:xfrm>
           <a:prstGeom prst="roundRect"/>
           <a:solidFill>
@@ -7584,17 +7584,17 @@
       </p:pic>
       <p:pic>
         <p:nvPicPr>
-          <p:cNvPr id="31" name="그림 23"/>
+          <p:cNvPr id="31" name="그림 23" descr="C:/Users/Admin1/AppData/Roaming/PolarisOffice/ETemp/20796_18072784/fImage22361739169.png"/>
           <p:cNvPicPr>
             <a:picLocks noChangeAspect="1"/>
           </p:cNvPicPr>
           <p:nvPr/>
         </p:nvPicPr>
         <p:blipFill rotWithShape="1">
-          <a:blip r:embed="rId10" cstate="print">
+          <a:blip r:embed="rId10" cstate="hqprint">
             <a:extLst>
               <a:ext uri="{28A0092B-C50C-407E-A947-70E740481C1C}">
-                <a14:useLocalDpi xmlns:a14="http://schemas.microsoft.com/office/drawing/2010/main" val="0"/>
+                <a14:useLocalDpi xmlns:a14="http://schemas.microsoft.com/office/drawing/2010/main"/>
               </a:ext>
             </a:extLst>
           </a:blip>
@@ -7604,8 +7604,8 @@
         </p:blipFill>
         <p:spPr>
           <a:xfrm rot="0">
-            <a:off x="9883775" y="3142615"/>
-            <a:ext cx="741045" cy="740410"/>
+            <a:off x="9975850" y="3208655"/>
+            <a:ext cx="582295" cy="675005"/>
           </a:xfrm>
           <a:prstGeom prst="roundRect"/>
           <a:solidFill>
@@ -7623,14 +7623,13 @@
           <p:nvPr/>
         </p:nvCxnSpPr>
         <p:spPr>
-          <a:xfrm rot="0" flipH="1" flipV="1">
-            <a:off x="10247630" y="2610485"/>
-            <a:ext cx="6985" cy="532765"/>
+          <a:xfrm rot="0" flipV="1">
+            <a:off x="10266680" y="2876550"/>
+            <a:ext cx="635" cy="332740"/>
           </a:xfrm>
           <a:prstGeom prst="straightConnector1"/>
           <a:ln w="6350" cap="flat" cmpd="sng">
             <a:prstDash/>
-            <a:headEnd type="none" w="med" len="med"/>
             <a:tailEnd type="triangle" w="med" len="med"/>
           </a:ln>
         </p:spPr>
@@ -9765,7 +9764,7 @@
         <p:spPr>
           <a:xfrm rot="0">
             <a:off x="1221740" y="5181600"/>
-            <a:ext cx="4157345" cy="954405"/>
+            <a:ext cx="4157980" cy="954405"/>
           </a:xfrm>
           <a:prstGeom prst="rect"/>
           <a:noFill/>
@@ -9792,24 +9791,56 @@
                 <a:latin typeface="맑은 고딕" charset="0"/>
                 <a:ea typeface="맑은 고딕" charset="0"/>
               </a:rPr>
-              <a:t>3</a:t>
-            </a:r>
-            <a:r>
-              <a:rPr sz="2000" b="1">
-                <a:solidFill>
-                  <a:srgbClr val="0611F2"/>
-                </a:solidFill>
-                <a:latin typeface="맑은 고딕" charset="0"/>
-                <a:ea typeface="맑은 고딕" charset="0"/>
-              </a:rPr>
-              <a:t>. </a:t>
+              <a:t>3. </a:t>
             </a:r>
             <a:r>
               <a:rPr lang="ko-KR" sz="1800">
                 <a:latin typeface="맑은 고딕" charset="0"/>
                 <a:ea typeface="맑은 고딕" charset="0"/>
               </a:rPr>
-              <a:t>그다음 Project 폴더에서 Texture에 In the woods 텍스처를 선택하고 Ground 이미지에 넣어줍니다.</a:t>
+              <a:t>그다음 Project 폴더에서 Texture</a:t>
+            </a:r>
+            <a:r>
+              <a:rPr lang="ko-KR" sz="1800">
+                <a:latin typeface="맑은 고딕" charset="0"/>
+                <a:ea typeface="맑은 고딕" charset="0"/>
+              </a:rPr>
+              <a:t> 폴더</a:t>
+            </a:r>
+            <a:r>
+              <a:rPr lang="ko-KR" sz="1800">
+                <a:latin typeface="맑은 고딕" charset="0"/>
+                <a:ea typeface="맑은 고딕" charset="0"/>
+              </a:rPr>
+              <a:t>에</a:t>
+            </a:r>
+            <a:r>
+              <a:rPr lang="ko-KR" sz="1800">
+                <a:latin typeface="맑은 고딕" charset="0"/>
+                <a:ea typeface="맑은 고딕" charset="0"/>
+              </a:rPr>
+              <a:t> 있는</a:t>
+            </a:r>
+            <a:r>
+              <a:rPr lang="ko-KR" sz="1800">
+                <a:latin typeface="맑은 고딕" charset="0"/>
+                <a:ea typeface="맑은 고딕" charset="0"/>
+              </a:rPr>
+              <a:t> </a:t>
+            </a:r>
+            <a:r>
+              <a:rPr lang="ko-KR" sz="1800">
+                <a:latin typeface="맑은 고딕" charset="0"/>
+                <a:ea typeface="맑은 고딕" charset="0"/>
+              </a:rPr>
+              <a:t>Penguin Island</a:t>
+            </a:r>
+            <a:r>
+              <a:rPr lang="ko-KR" sz="1800">
+                <a:latin typeface="맑은 고딕" charset="0"/>
+                <a:ea typeface="맑은 고딕" charset="0"/>
+              </a:rPr>
+              <a:t> 텍스처를  Ground 이미지에 넣어줍니다.</a:t>
             </a:r>
             <a:endParaRPr lang="ko-KR" altLang="en-US" sz="1800">
               <a:latin typeface="맑은 고딕" charset="0"/>
@@ -9820,100 +9851,7 @@
       </p:sp>
       <p:pic>
         <p:nvPicPr>
-          <p:cNvPr id="29" name="그림 15"/>
-          <p:cNvPicPr>
-            <a:picLocks noChangeAspect="1"/>
-          </p:cNvPicPr>
-          <p:nvPr/>
-        </p:nvPicPr>
-        <p:blipFill rotWithShape="1">
-          <a:blip r:embed="rId2" cstate="print">
-            <a:extLst>
-              <a:ext uri="{28A0092B-C50C-407E-A947-70E740481C1C}">
-                <a14:useLocalDpi xmlns:a14="http://schemas.microsoft.com/office/drawing/2010/main" val="0"/>
-              </a:ext>
-            </a:extLst>
-          </a:blip>
-          <a:stretch>
-            <a:fillRect/>
-          </a:stretch>
-        </p:blipFill>
-        <p:spPr>
-          <a:xfrm rot="0">
-            <a:off x="1222375" y="1377950"/>
-            <a:ext cx="4140200" cy="1565275"/>
-          </a:xfrm>
-          <a:prstGeom prst="roundRect"/>
-          <a:solidFill>
-            <a:srgbClr val="EDEDED"/>
-          </a:solidFill>
-        </p:spPr>
-      </p:pic>
-      <p:pic>
-        <p:nvPicPr>
-          <p:cNvPr id="30" name="그림 16"/>
-          <p:cNvPicPr>
-            <a:picLocks noChangeAspect="1"/>
-          </p:cNvPicPr>
-          <p:nvPr/>
-        </p:nvPicPr>
-        <p:blipFill rotWithShape="1">
-          <a:blip r:embed="rId3" cstate="print">
-            <a:extLst>
-              <a:ext uri="{28A0092B-C50C-407E-A947-70E740481C1C}">
-                <a14:useLocalDpi xmlns:a14="http://schemas.microsoft.com/office/drawing/2010/main" val="0"/>
-              </a:ext>
-            </a:extLst>
-          </a:blip>
-          <a:stretch>
-            <a:fillRect/>
-          </a:stretch>
-        </p:blipFill>
-        <p:spPr>
-          <a:xfrm rot="0">
-            <a:off x="1229995" y="3117850"/>
-            <a:ext cx="4149090" cy="1920875"/>
-          </a:xfrm>
-          <a:prstGeom prst="roundRect"/>
-          <a:solidFill>
-            <a:srgbClr val="EDEDED"/>
-          </a:solidFill>
-        </p:spPr>
-      </p:pic>
-      <p:pic>
-        <p:nvPicPr>
-          <p:cNvPr id="31" name="그림 27"/>
-          <p:cNvPicPr>
-            <a:picLocks noChangeAspect="1"/>
-          </p:cNvPicPr>
-          <p:nvPr/>
-        </p:nvPicPr>
-        <p:blipFill rotWithShape="1">
-          <a:blip r:embed="rId4" cstate="print">
-            <a:extLst>
-              <a:ext uri="{28A0092B-C50C-407E-A947-70E740481C1C}">
-                <a14:useLocalDpi xmlns:a14="http://schemas.microsoft.com/office/drawing/2010/main" val="0"/>
-              </a:ext>
-            </a:extLst>
-          </a:blip>
-          <a:stretch>
-            <a:fillRect/>
-          </a:stretch>
-        </p:blipFill>
-        <p:spPr>
-          <a:xfrm rot="0">
-            <a:off x="9626600" y="1837055"/>
-            <a:ext cx="1397000" cy="2569845"/>
-          </a:xfrm>
-          <a:prstGeom prst="roundRect"/>
-          <a:solidFill>
-            <a:srgbClr val="EDEDED"/>
-          </a:solidFill>
-        </p:spPr>
-      </p:pic>
-      <p:pic>
-        <p:nvPicPr>
-          <p:cNvPr id="32" name="그림 29"/>
+          <p:cNvPr id="32" name="그림 29" descr="C:/Users/Admin1/AppData/Roaming/PolarisOffice/ETemp/20796_18072784/fImage191381786962.png"/>
           <p:cNvPicPr>
             <a:picLocks noChangeAspect="1"/>
           </p:cNvPicPr>
@@ -9933,8 +9871,8 @@
         </p:blipFill>
         <p:spPr>
           <a:xfrm rot="0">
-            <a:off x="6824980" y="1263650"/>
-            <a:ext cx="2577465" cy="3757930"/>
+            <a:off x="6824980" y="1413510"/>
+            <a:ext cx="2578100" cy="3616325"/>
           </a:xfrm>
           <a:prstGeom prst="roundRect"/>
           <a:solidFill>
@@ -9953,7 +9891,7 @@
         <p:spPr>
           <a:xfrm rot="0">
             <a:off x="6821805" y="5179060"/>
-            <a:ext cx="4193540" cy="954405"/>
+            <a:ext cx="4135755" cy="954405"/>
           </a:xfrm>
           <a:prstGeom prst="rect"/>
           <a:noFill/>
@@ -9990,14 +9928,28 @@
                 <a:latin typeface="맑은 고딕" charset="0"/>
                 <a:ea typeface="맑은 고딕" charset="0"/>
               </a:rPr>
-              <a:t>. </a:t>
+              <a:t>.</a:t>
             </a:r>
             <a:r>
               <a:rPr lang="ko-KR" sz="1800">
                 <a:latin typeface="맑은 고딕" charset="0"/>
                 <a:ea typeface="맑은 고딕" charset="0"/>
               </a:rPr>
-              <a:t>이제 UI에서 Button 2개를 생성하고 각각 Room Join 이라는 이름과 Room Create 라는 이름으로 정의합니다.</a:t>
+              <a:t> </a:t>
+            </a:r>
+            <a:r>
+              <a:rPr lang="ko-KR" sz="1800">
+                <a:latin typeface="맑은 고딕" charset="0"/>
+                <a:ea typeface="맑은 고딕" charset="0"/>
+              </a:rPr>
+              <a:t>마지막으로 </a:t>
+            </a:r>
+            <a:r>
+              <a:rPr lang="ko-KR" sz="1800">
+                <a:latin typeface="맑은 고딕" charset="0"/>
+                <a:ea typeface="맑은 고딕" charset="0"/>
+              </a:rPr>
+              <a:t>UI에서 Button를 생성하고 Room Create라는 이름으로 정의합니다.</a:t>
             </a:r>
             <a:endParaRPr lang="ko-KR" altLang="en-US" sz="1800">
               <a:latin typeface="맑은 고딕" charset="0"/>
@@ -10006,6 +9958,132 @@
           </a:p>
         </p:txBody>
       </p:sp>
+      <p:pic>
+        <p:nvPicPr>
+          <p:cNvPr id="34" name="그림 1" descr="C:/Users/Admin1/AppData/Roaming/PolarisOffice/ETemp/20796_18072784/fImage1490419241.png"/>
+          <p:cNvPicPr>
+            <a:picLocks noChangeAspect="1"/>
+          </p:cNvPicPr>
+          <p:nvPr/>
+        </p:nvPicPr>
+        <p:blipFill rotWithShape="1">
+          <a:blip r:embed="rId7" cstate="print">
+            <a:extLst>
+              <a:ext uri="{28A0092B-C50C-407E-A947-70E740481C1C}">
+                <a14:useLocalDpi xmlns:a14="http://schemas.microsoft.com/office/drawing/2010/main" val="0"/>
+              </a:ext>
+            </a:extLst>
+          </a:blip>
+          <a:stretch>
+            <a:fillRect/>
+          </a:stretch>
+        </p:blipFill>
+        <p:spPr>
+          <a:xfrm rot="0">
+            <a:off x="1225550" y="1413510"/>
+            <a:ext cx="4153535" cy="1297305"/>
+          </a:xfrm>
+          <a:prstGeom prst="roundRect"/>
+          <a:solidFill>
+            <a:srgbClr val="EDEDED"/>
+          </a:solidFill>
+        </p:spPr>
+      </p:pic>
+      <p:pic>
+        <p:nvPicPr>
+          <p:cNvPr id="35" name="그림 4" descr="C:/Users/Admin1/AppData/Roaming/PolarisOffice/ETemp/20796_18072784/fImage166571938467.png"/>
+          <p:cNvPicPr>
+            <a:picLocks noChangeAspect="1"/>
+          </p:cNvPicPr>
+          <p:nvPr/>
+        </p:nvPicPr>
+        <p:blipFill rotWithShape="1">
+          <a:blip r:embed="rId8" cstate="print">
+            <a:extLst>
+              <a:ext uri="{28A0092B-C50C-407E-A947-70E740481C1C}">
+                <a14:useLocalDpi xmlns:a14="http://schemas.microsoft.com/office/drawing/2010/main" val="0"/>
+              </a:ext>
+            </a:extLst>
+          </a:blip>
+          <a:stretch>
+            <a:fillRect/>
+          </a:stretch>
+        </p:blipFill>
+        <p:spPr>
+          <a:xfrm rot="0">
+            <a:off x="1219200" y="2934335"/>
+            <a:ext cx="4159885" cy="2103755"/>
+          </a:xfrm>
+          <a:prstGeom prst="roundRect"/>
+          <a:solidFill>
+            <a:srgbClr val="EDEDED"/>
+          </a:solidFill>
+        </p:spPr>
+      </p:pic>
+      <p:cxnSp>
+        <p:nvCxnSpPr>
+          <p:cNvPr id="36" name="도형 7"/>
+          <p:cNvCxnSpPr/>
+          <p:nvPr/>
+        </p:nvCxnSpPr>
+        <p:spPr>
+          <a:xfrm rot="0">
+            <a:off x="3865880" y="2635250"/>
+            <a:ext cx="1388745" cy="681990"/>
+          </a:xfrm>
+          <a:prstGeom prst="straightConnector1"/>
+          <a:ln w="6350" cap="flat" cmpd="sng">
+            <a:prstDash/>
+            <a:headEnd type="none" w="med" len="med"/>
+            <a:tailEnd type="triangle" w="med" len="med"/>
+          </a:ln>
+        </p:spPr>
+        <p:style>
+          <a:lnRef idx="1">
+            <a:schemeClr val="accent1"/>
+          </a:lnRef>
+          <a:fillRef idx="0">
+            <a:schemeClr val="accent1"/>
+          </a:fillRef>
+          <a:effectRef idx="0">
+            <a:schemeClr val="accent1"/>
+          </a:effectRef>
+          <a:fontRef idx="minor">
+            <a:schemeClr val="tx1"/>
+          </a:fontRef>
+        </p:style>
+      </p:cxnSp>
+      <p:pic>
+        <p:nvPicPr>
+          <p:cNvPr id="37" name="그림 9" descr="C:/Users/Admin1/AppData/Roaming/PolarisOffice/ETemp/20796_18072784/fImage60211966334.png"/>
+          <p:cNvPicPr>
+            <a:picLocks noChangeAspect="1"/>
+          </p:cNvPicPr>
+          <p:nvPr/>
+        </p:nvPicPr>
+        <p:blipFill rotWithShape="1">
+          <a:blip r:embed="rId9" cstate="print">
+            <a:extLst>
+              <a:ext uri="{28A0092B-C50C-407E-A947-70E740481C1C}">
+                <a14:useLocalDpi xmlns:a14="http://schemas.microsoft.com/office/drawing/2010/main" val="0"/>
+              </a:ext>
+            </a:extLst>
+          </a:blip>
+          <a:stretch>
+            <a:fillRect/>
+          </a:stretch>
+        </p:blipFill>
+        <p:spPr>
+          <a:xfrm rot="0">
+            <a:off x="9506585" y="2136140"/>
+            <a:ext cx="1450975" cy="2178685"/>
+          </a:xfrm>
+          <a:prstGeom prst="roundRect"/>
+          <a:solidFill>
+            <a:srgbClr val="EDEDED"/>
+          </a:solidFill>
+        </p:spPr>
+      </p:pic>
     </p:spTree>
   </p:cSld>
   <p:clrMapOvr>
@@ -10107,8 +10185,8 @@
         </p:nvSpPr>
         <p:spPr>
           <a:xfrm rot="0">
-            <a:off x="1213485" y="4907280"/>
-            <a:ext cx="4157345" cy="1231265"/>
+            <a:off x="1213485" y="3102610"/>
+            <a:ext cx="4157980" cy="677545"/>
           </a:xfrm>
           <a:prstGeom prst="rect"/>
           <a:noFill/>
@@ -10152,116 +10230,105 @@
                 <a:latin typeface="맑은 고딕" charset="0"/>
                 <a:ea typeface="맑은 고딕" charset="0"/>
               </a:rPr>
-              <a:t>그리고 Room Join Button과 Room Create Button을 선택합니다.</a:t>
+              <a:t>이제</a:t>
+            </a:r>
+            <a:r>
+              <a:rPr lang="ko-KR" sz="1800">
+                <a:latin typeface="맑은 고딕" charset="0"/>
+                <a:ea typeface="맑은 고딕" charset="0"/>
+              </a:rPr>
+              <a:t> Room Create Button</a:t>
+            </a:r>
+            <a:r>
+              <a:rPr lang="ko-KR" sz="1800">
+                <a:latin typeface="맑은 고딕" charset="0"/>
+                <a:ea typeface="맑은 고딕" charset="0"/>
+              </a:rPr>
+              <a:t>의</a:t>
+            </a:r>
+            <a:r>
+              <a:rPr lang="ko-KR" sz="1800">
+                <a:latin typeface="맑은 고딕" charset="0"/>
+                <a:ea typeface="맑은 고딕" charset="0"/>
+              </a:rPr>
+              <a:t> 앵커</a:t>
+            </a:r>
+            <a:r>
+              <a:rPr lang="ko-KR" sz="1800">
+                <a:latin typeface="맑은 고딕" charset="0"/>
+                <a:ea typeface="맑은 고딕" charset="0"/>
+              </a:rPr>
+              <a:t>를 지정하고</a:t>
+            </a:r>
+            <a:r>
+              <a:rPr lang="ko-KR" sz="1800">
+                <a:latin typeface="맑은 고딕" charset="0"/>
+                <a:ea typeface="맑은 고딕" charset="0"/>
+              </a:rPr>
+              <a:t> 위치</a:t>
+            </a:r>
+            <a:r>
+              <a:rPr lang="ko-KR" sz="1800">
+                <a:latin typeface="맑은 고딕" charset="0"/>
+                <a:ea typeface="맑은 고딕" charset="0"/>
+              </a:rPr>
+              <a:t>와 크기</a:t>
+            </a:r>
+            <a:r>
+              <a:rPr lang="ko-KR" sz="1800">
+                <a:latin typeface="맑은 고딕" charset="0"/>
+                <a:ea typeface="맑은 고딕" charset="0"/>
+              </a:rPr>
+              <a:t>를 설정합니다.</a:t>
             </a:r>
             <a:endParaRPr lang="ko-KR" altLang="en-US" sz="1800">
               <a:latin typeface="맑은 고딕" charset="0"/>
               <a:ea typeface="맑은 고딕" charset="0"/>
             </a:endParaRPr>
           </a:p>
-          <a:p>
-            <a:pPr marL="0" indent="0" rtl="0" algn="l" defTabSz="914400" eaLnBrk="1" latinLnBrk="0" hangingPunct="1">
-              <a:buFontTx/>
-              <a:buNone/>
-            </a:pPr>
-            <a:endParaRPr lang="ko-KR" altLang="en-US" sz="1800">
-              <a:latin typeface="맑은 고딕" charset="0"/>
-              <a:ea typeface="맑은 고딕" charset="0"/>
-            </a:endParaRPr>
-          </a:p>
-          <a:p>
-            <a:pPr marL="0" indent="0" rtl="0" algn="l" defTabSz="914400" eaLnBrk="1" latinLnBrk="0" hangingPunct="1">
-              <a:buFontTx/>
-              <a:buNone/>
-            </a:pPr>
-            <a:r>
-              <a:rPr lang="ko-KR" sz="1800">
-                <a:latin typeface="맑은 고딕" charset="0"/>
-                <a:ea typeface="맑은 고딕" charset="0"/>
-              </a:rPr>
-              <a:t>그런 다음 앵커와 위치를 설정합니다.</a:t>
-            </a:r>
-            <a:endParaRPr lang="ko-KR" altLang="en-US" sz="1800">
-              <a:latin typeface="맑은 고딕" charset="0"/>
-              <a:ea typeface="맑은 고딕" charset="0"/>
-            </a:endParaRPr>
-          </a:p>
-        </p:txBody>
-      </p:sp>
-      <p:sp>
-        <p:nvSpPr>
-          <p:cNvPr id="33" name="Rect 0"/>
-          <p:cNvSpPr txBox="1">
-            <a:spLocks/>
-          </p:cNvSpPr>
-          <p:nvPr/>
-        </p:nvSpPr>
-        <p:spPr>
-          <a:xfrm rot="0">
-            <a:off x="6821805" y="4904105"/>
-            <a:ext cx="4193540" cy="1231265"/>
-          </a:xfrm>
-          <a:prstGeom prst="rect"/>
-          <a:noFill/>
-          <a:ln w="0">
-            <a:noFill/>
-            <a:prstDash/>
-          </a:ln>
-        </p:spPr>
-        <p:txBody>
-          <a:bodyPr wrap="square" lIns="89535" tIns="46355" rIns="89535" bIns="46355" numCol="1" vert="horz" anchor="t">
-            <a:spAutoFit/>
-          </a:bodyPr>
-          <a:lstStyle/>
-          <a:p>
-            <a:pPr marL="0" indent="0" rtl="0" algn="l" defTabSz="914400" eaLnBrk="1" latinLnBrk="0" hangingPunct="1">
-              <a:buFontTx/>
-              <a:buNone/>
-            </a:pPr>
-            <a:r>
-              <a:rPr lang="ko-KR" sz="2000" b="1">
-                <a:solidFill>
-                  <a:srgbClr val="0611F2"/>
-                </a:solidFill>
-                <a:latin typeface="맑은 고딕" charset="0"/>
-                <a:ea typeface="맑은 고딕" charset="0"/>
-              </a:rPr>
-              <a:t>6</a:t>
-            </a:r>
-            <a:r>
-              <a:rPr sz="2000" b="1">
-                <a:solidFill>
-                  <a:srgbClr val="0611F2"/>
-                </a:solidFill>
-                <a:latin typeface="맑은 고딕" charset="0"/>
-                <a:ea typeface="맑은 고딕" charset="0"/>
-              </a:rPr>
-              <a:t>. </a:t>
-            </a:r>
-            <a:r>
-              <a:rPr lang="ko-KR" sz="1800">
-                <a:latin typeface="맑은 고딕" charset="0"/>
-                <a:ea typeface="맑은 고딕" charset="0"/>
-              </a:rPr>
-              <a:t>이제 Room Join Button과 Room Create Button의 하위 오브젝트의 텍스트 이름을 Room Join Text와 Room Create Text로 정의합니다.</a:t>
-            </a:r>
-            <a:endParaRPr lang="ko-KR" altLang="en-US" sz="1800">
-              <a:latin typeface="맑은 고딕" charset="0"/>
-              <a:ea typeface="맑은 고딕" charset="0"/>
-            </a:endParaRPr>
-          </a:p>
         </p:txBody>
       </p:sp>
       <p:pic>
         <p:nvPicPr>
-          <p:cNvPr id="34" name="그림 33"/>
+          <p:cNvPr id="35" name="그림 34" descr="C:/Users/Admin1/AppData/Roaming/PolarisOffice/ETemp/20796_18072784/fImage132661925705.png"/>
           <p:cNvPicPr>
             <a:picLocks noChangeAspect="1"/>
           </p:cNvPicPr>
           <p:nvPr/>
         </p:nvPicPr>
         <p:blipFill rotWithShape="1">
-          <a:blip r:embed="rId2" cstate="print">
+          <a:blip r:embed="rId3" cstate="hqprint">
+            <a:extLst>
+              <a:ext uri="{28A0092B-C50C-407E-A947-70E740481C1C}">
+                <a14:useLocalDpi xmlns:a14="http://schemas.microsoft.com/office/drawing/2010/main"/>
+              </a:ext>
+            </a:extLst>
+          </a:blip>
+          <a:stretch>
+            <a:fillRect/>
+          </a:stretch>
+        </p:blipFill>
+        <p:spPr>
+          <a:xfrm rot="0">
+            <a:off x="1214120" y="1446530"/>
+            <a:ext cx="4157345" cy="1538605"/>
+          </a:xfrm>
+          <a:prstGeom prst="roundRect"/>
+          <a:solidFill>
+            <a:srgbClr val="EDEDED"/>
+          </a:solidFill>
+        </p:spPr>
+      </p:pic>
+      <p:pic>
+        <p:nvPicPr>
+          <p:cNvPr id="36" name="그림 12" descr="C:/Users/Admin1/AppData/Roaming/PolarisOffice/ETemp/20796_18072784/fImage123211976500.png"/>
+          <p:cNvPicPr>
+            <a:picLocks noChangeAspect="1"/>
+          </p:cNvPicPr>
+          <p:nvPr/>
+        </p:nvPicPr>
+        <p:blipFill rotWithShape="1">
+          <a:blip r:embed="rId6" cstate="print">
             <a:extLst>
               <a:ext uri="{28A0092B-C50C-407E-A947-70E740481C1C}">
                 <a14:useLocalDpi xmlns:a14="http://schemas.microsoft.com/office/drawing/2010/main" val="0"/>
@@ -10274,8 +10341,8 @@
         </p:blipFill>
         <p:spPr>
           <a:xfrm rot="0">
-            <a:off x="1219200" y="1261745"/>
-            <a:ext cx="4143375" cy="1598295"/>
+            <a:off x="1217295" y="3895725"/>
+            <a:ext cx="4161790" cy="1466215"/>
           </a:xfrm>
           <a:prstGeom prst="roundRect"/>
           <a:solidFill>
@@ -10283,16 +10350,251 @@
           </a:solidFill>
         </p:spPr>
       </p:pic>
+      <p:sp>
+        <p:nvSpPr>
+          <p:cNvPr id="37" name="텍스트 상자 15"/>
+          <p:cNvSpPr txBox="1">
+            <a:spLocks/>
+          </p:cNvSpPr>
+          <p:nvPr/>
+        </p:nvSpPr>
+        <p:spPr>
+          <a:xfrm rot="0">
+            <a:off x="1216025" y="5458460"/>
+            <a:ext cx="4194175" cy="677545"/>
+          </a:xfrm>
+          <a:prstGeom prst="rect"/>
+          <a:noFill/>
+          <a:ln w="0">
+            <a:noFill/>
+            <a:prstDash/>
+          </a:ln>
+        </p:spPr>
+        <p:txBody>
+          <a:bodyPr wrap="square" lIns="89535" tIns="46355" rIns="89535" bIns="46355" numCol="1" vert="horz" anchor="t">
+            <a:spAutoFit/>
+          </a:bodyPr>
+          <a:lstStyle/>
+          <a:p>
+            <a:pPr marL="0" indent="0" rtl="0" algn="l" defTabSz="914400" eaLnBrk="1" latinLnBrk="0" hangingPunct="1">
+              <a:buFontTx/>
+              <a:buNone/>
+            </a:pPr>
+            <a:r>
+              <a:rPr lang="ko-KR" sz="2000" b="1">
+                <a:solidFill>
+                  <a:srgbClr val="0611F2"/>
+                </a:solidFill>
+                <a:latin typeface="맑은 고딕" charset="0"/>
+                <a:ea typeface="맑은 고딕" charset="0"/>
+              </a:rPr>
+              <a:t>6</a:t>
+            </a:r>
+            <a:r>
+              <a:rPr sz="2000" b="1">
+                <a:solidFill>
+                  <a:srgbClr val="0611F2"/>
+                </a:solidFill>
+                <a:latin typeface="맑은 고딕" charset="0"/>
+                <a:ea typeface="맑은 고딕" charset="0"/>
+              </a:rPr>
+              <a:t>. </a:t>
+            </a:r>
+            <a:r>
+              <a:rPr lang="ko-KR" sz="1800">
+                <a:latin typeface="맑은 고딕" charset="0"/>
+                <a:ea typeface="맑은 고딕" charset="0"/>
+              </a:rPr>
+              <a:t>그리고 </a:t>
+            </a:r>
+            <a:r>
+              <a:rPr lang="ko-KR" sz="1800">
+                <a:latin typeface="맑은 고딕" charset="0"/>
+                <a:ea typeface="맑은 고딕" charset="0"/>
+              </a:rPr>
+              <a:t>Room Create Text</a:t>
+            </a:r>
+            <a:r>
+              <a:rPr lang="ko-KR" sz="1800">
+                <a:latin typeface="맑은 고딕" charset="0"/>
+                <a:ea typeface="맑은 고딕" charset="0"/>
+              </a:rPr>
+              <a:t>의 위치를</a:t>
+            </a:r>
+            <a:r>
+              <a:rPr lang="ko-KR" sz="1800">
+                <a:latin typeface="맑은 고딕" charset="0"/>
+                <a:ea typeface="맑은 고딕" charset="0"/>
+              </a:rPr>
+              <a:t> </a:t>
+            </a:r>
+            <a:r>
+              <a:rPr lang="ko-KR" sz="1800">
+                <a:latin typeface="맑은 고딕" charset="0"/>
+                <a:ea typeface="맑은 고딕" charset="0"/>
+              </a:rPr>
+              <a:t>조정</a:t>
+            </a:r>
+            <a:r>
+              <a:rPr lang="ko-KR" sz="1800">
+                <a:latin typeface="맑은 고딕" charset="0"/>
+                <a:ea typeface="맑은 고딕" charset="0"/>
+              </a:rPr>
+              <a:t>합니다.</a:t>
+            </a:r>
+            <a:endParaRPr lang="ko-KR" altLang="en-US" sz="1800">
+              <a:latin typeface="맑은 고딕" charset="0"/>
+              <a:ea typeface="맑은 고딕" charset="0"/>
+            </a:endParaRPr>
+          </a:p>
+        </p:txBody>
+      </p:sp>
+      <p:sp>
+        <p:nvSpPr>
+          <p:cNvPr id="38" name="텍스트 상자 20"/>
+          <p:cNvSpPr txBox="1">
+            <a:spLocks/>
+          </p:cNvSpPr>
+          <p:nvPr/>
+        </p:nvSpPr>
+        <p:spPr>
+          <a:xfrm rot="0">
+            <a:off x="6849745" y="4350385"/>
+            <a:ext cx="4173855" cy="1784985"/>
+          </a:xfrm>
+          <a:prstGeom prst="rect"/>
+          <a:noFill/>
+          <a:ln w="0">
+            <a:noFill/>
+            <a:prstDash/>
+          </a:ln>
+        </p:spPr>
+        <p:txBody>
+          <a:bodyPr wrap="square" lIns="89535" tIns="46355" rIns="89535" bIns="46355" numCol="1" vert="horz" anchor="t">
+            <a:spAutoFit/>
+          </a:bodyPr>
+          <a:lstStyle/>
+          <a:p>
+            <a:pPr marL="0" indent="0" rtl="0" algn="l" defTabSz="914400" eaLnBrk="1" latinLnBrk="0" hangingPunct="1">
+              <a:buFontTx/>
+              <a:buNone/>
+            </a:pPr>
+            <a:r>
+              <a:rPr lang="ko-KR" sz="2000" b="1">
+                <a:solidFill>
+                  <a:srgbClr val="0611F2"/>
+                </a:solidFill>
+                <a:latin typeface="맑은 고딕" charset="0"/>
+                <a:ea typeface="맑은 고딕" charset="0"/>
+              </a:rPr>
+              <a:t>7</a:t>
+            </a:r>
+            <a:r>
+              <a:rPr sz="2000" b="1">
+                <a:solidFill>
+                  <a:srgbClr val="0611F2"/>
+                </a:solidFill>
+                <a:latin typeface="맑은 고딕" charset="0"/>
+                <a:ea typeface="맑은 고딕" charset="0"/>
+              </a:rPr>
+              <a:t>. </a:t>
+            </a:r>
+            <a:r>
+              <a:rPr lang="ko-KR" sz="1800">
+                <a:latin typeface="맑은 고딕" charset="0"/>
+                <a:ea typeface="맑은 고딕" charset="0"/>
+              </a:rPr>
+              <a:t>그다음으로 UI에서 Input Field 2개를 생성합니다.</a:t>
+            </a:r>
+            <a:endParaRPr lang="ko-KR" altLang="en-US" sz="1800">
+              <a:latin typeface="맑은 고딕" charset="0"/>
+              <a:ea typeface="맑은 고딕" charset="0"/>
+            </a:endParaRPr>
+          </a:p>
+          <a:p>
+            <a:pPr marL="0" indent="0" rtl="0" algn="l" defTabSz="914400" eaLnBrk="1" latinLnBrk="0" hangingPunct="1">
+              <a:buFontTx/>
+              <a:buNone/>
+            </a:pPr>
+            <a:endParaRPr lang="ko-KR" altLang="en-US" sz="1800">
+              <a:latin typeface="맑은 고딕" charset="0"/>
+              <a:ea typeface="맑은 고딕" charset="0"/>
+            </a:endParaRPr>
+          </a:p>
+          <a:p>
+            <a:pPr marL="0" indent="0" rtl="0" algn="l" defTabSz="914400" eaLnBrk="1" latinLnBrk="0" hangingPunct="1">
+              <a:buFontTx/>
+              <a:buNone/>
+            </a:pPr>
+            <a:r>
+              <a:rPr lang="ko-KR" sz="1800">
+                <a:latin typeface="맑은 고딕" charset="0"/>
+                <a:ea typeface="맑은 고딕" charset="0"/>
+              </a:rPr>
+              <a:t>그</a:t>
+            </a:r>
+            <a:r>
+              <a:rPr lang="ko-KR" sz="1800">
+                <a:latin typeface="맑은 고딕" charset="0"/>
+                <a:ea typeface="맑은 고딕" charset="0"/>
+              </a:rPr>
+              <a:t>런 다음</a:t>
+            </a:r>
+            <a:r>
+              <a:rPr lang="ko-KR" sz="1800">
+                <a:latin typeface="맑은 고딕" charset="0"/>
+                <a:ea typeface="맑은 고딕" charset="0"/>
+              </a:rPr>
+              <a:t> Room Person이라는 이름과 Room Name이라는 이름으로 정의합니다.</a:t>
+            </a:r>
+            <a:endParaRPr lang="ko-KR" altLang="en-US" sz="1800">
+              <a:latin typeface="맑은 고딕" charset="0"/>
+              <a:ea typeface="맑은 고딕" charset="0"/>
+            </a:endParaRPr>
+          </a:p>
+        </p:txBody>
+      </p:sp>
       <p:pic>
         <p:nvPicPr>
-          <p:cNvPr id="35" name="그림 34"/>
+          <p:cNvPr id="39" name="그림 21" descr="C:/Users/Admin1/AppData/Roaming/PolarisOffice/ETemp/20796_18072784/fImage191502126827.png"/>
           <p:cNvPicPr>
             <a:picLocks noChangeAspect="1"/>
           </p:cNvPicPr>
           <p:nvPr/>
         </p:nvPicPr>
         <p:blipFill rotWithShape="1">
-          <a:blip r:embed="rId3" cstate="print">
+          <a:blip r:embed="rId7" cstate="hqprint">
+            <a:extLst>
+              <a:ext uri="{28A0092B-C50C-407E-A947-70E740481C1C}">
+                <a14:useLocalDpi xmlns:a14="http://schemas.microsoft.com/office/drawing/2010/main"/>
+              </a:ext>
+            </a:extLst>
+          </a:blip>
+          <a:stretch>
+            <a:fillRect/>
+          </a:stretch>
+        </p:blipFill>
+        <p:spPr>
+          <a:xfrm rot="0">
+            <a:off x="6854825" y="1446530"/>
+            <a:ext cx="2680970" cy="2811145"/>
+          </a:xfrm>
+          <a:prstGeom prst="roundRect"/>
+          <a:solidFill>
+            <a:srgbClr val="EDEDED"/>
+          </a:solidFill>
+        </p:spPr>
+      </p:pic>
+      <p:pic>
+        <p:nvPicPr>
+          <p:cNvPr id="40" name="그림 22" descr="C:/Users/Admin1/AppData/Roaming/PolarisOffice/ETemp/20796_18072784/fImage84842039169.png"/>
+          <p:cNvPicPr>
+            <a:picLocks noChangeAspect="1"/>
+          </p:cNvPicPr>
+          <p:nvPr/>
+        </p:nvPicPr>
+        <p:blipFill rotWithShape="1">
+          <a:blip r:embed="rId8" cstate="print">
             <a:extLst>
               <a:ext uri="{28A0092B-C50C-407E-A947-70E740481C1C}">
                 <a14:useLocalDpi xmlns:a14="http://schemas.microsoft.com/office/drawing/2010/main" val="0"/>
@@ -10305,39 +10607,8 @@
         </p:blipFill>
         <p:spPr>
           <a:xfrm rot="0">
-            <a:off x="1214120" y="3121660"/>
-            <a:ext cx="4156710" cy="1592580"/>
-          </a:xfrm>
-          <a:prstGeom prst="roundRect"/>
-          <a:solidFill>
-            <a:srgbClr val="EDEDED"/>
-          </a:solidFill>
-        </p:spPr>
-      </p:pic>
-      <p:pic>
-        <p:nvPicPr>
-          <p:cNvPr id="36" name="그림 39"/>
-          <p:cNvPicPr>
-            <a:picLocks noChangeAspect="1"/>
-          </p:cNvPicPr>
-          <p:nvPr/>
-        </p:nvPicPr>
-        <p:blipFill rotWithShape="1">
-          <a:blip r:embed="rId4" cstate="print">
-            <a:extLst>
-              <a:ext uri="{28A0092B-C50C-407E-A947-70E740481C1C}">
-                <a14:useLocalDpi xmlns:a14="http://schemas.microsoft.com/office/drawing/2010/main" val="0"/>
-              </a:ext>
-            </a:extLst>
-          </a:blip>
-          <a:stretch>
-            <a:fillRect/>
-          </a:stretch>
-        </p:blipFill>
-        <p:spPr>
-          <a:xfrm rot="0">
-            <a:off x="6829425" y="1255395"/>
-            <a:ext cx="4185920" cy="3467100"/>
+            <a:off x="9709785" y="1870710"/>
+            <a:ext cx="1313815" cy="1870710"/>
           </a:xfrm>
           <a:prstGeom prst="roundRect"/>
           <a:solidFill>
@@ -10438,7 +10709,7 @@
       </p:sp>
       <p:sp>
         <p:nvSpPr>
-          <p:cNvPr id="24" name="Rect 0"/>
+          <p:cNvPr id="41" name="텍스트 상자 23"/>
           <p:cNvSpPr txBox="1">
             <a:spLocks/>
           </p:cNvSpPr>
@@ -10446,8 +10717,8 @@
         </p:nvSpPr>
         <p:spPr>
           <a:xfrm rot="0">
-            <a:off x="1213485" y="4350385"/>
-            <a:ext cx="4165600" cy="1784985"/>
+            <a:off x="1147445" y="5461000"/>
+            <a:ext cx="4207510" cy="677545"/>
           </a:xfrm>
           <a:prstGeom prst="rect"/>
           <a:noFill/>
@@ -10474,7 +10745,7 @@
                 <a:latin typeface="맑은 고딕" charset="0"/>
                 <a:ea typeface="맑은 고딕" charset="0"/>
               </a:rPr>
-              <a:t>7</a:t>
+              <a:t>8</a:t>
             </a:r>
             <a:r>
               <a:rPr sz="2000" b="1">
@@ -10491,202 +10762,32 @@
                 <a:latin typeface="맑은 고딕" charset="0"/>
                 <a:ea typeface="맑은 고딕" charset="0"/>
               </a:rPr>
-              <a:t>그다음으로 UI에서 Input Field 2개를 생성합니다.</a:t>
+              <a:t>그</a:t>
+            </a:r>
+            <a:r>
+              <a:rPr lang="ko-KR" sz="1800">
+                <a:latin typeface="맑은 고딕" charset="0"/>
+                <a:ea typeface="맑은 고딕" charset="0"/>
+              </a:rPr>
+              <a:t>러고 나서</a:t>
+            </a:r>
+            <a:r>
+              <a:rPr lang="ko-KR" sz="1800">
+                <a:latin typeface="맑은 고딕" charset="0"/>
+                <a:ea typeface="맑은 고딕" charset="0"/>
+              </a:rPr>
+              <a:t> UI에서 Scroll View를 생성합니다.</a:t>
             </a:r>
             <a:endParaRPr lang="ko-KR" altLang="en-US" sz="1800">
               <a:latin typeface="맑은 고딕" charset="0"/>
               <a:ea typeface="맑은 고딕" charset="0"/>
             </a:endParaRPr>
           </a:p>
-          <a:p>
-            <a:pPr marL="0" indent="0" rtl="0" algn="l" defTabSz="914400" eaLnBrk="1" latinLnBrk="0" hangingPunct="1">
-              <a:buFontTx/>
-              <a:buNone/>
-            </a:pPr>
-            <a:endParaRPr lang="ko-KR" altLang="en-US" sz="1800">
-              <a:latin typeface="맑은 고딕" charset="0"/>
-              <a:ea typeface="맑은 고딕" charset="0"/>
-            </a:endParaRPr>
-          </a:p>
-          <a:p>
-            <a:pPr marL="0" indent="0" rtl="0" algn="l" defTabSz="914400" eaLnBrk="1" latinLnBrk="0" hangingPunct="1">
-              <a:buFontTx/>
-              <a:buNone/>
-            </a:pPr>
-            <a:r>
-              <a:rPr lang="ko-KR" sz="1800">
-                <a:latin typeface="맑은 고딕" charset="0"/>
-                <a:ea typeface="맑은 고딕" charset="0"/>
-              </a:rPr>
-              <a:t>그리고 Room Person이라는 이름과 Room Name이라는 이름으로 정의합니다.</a:t>
-            </a:r>
-            <a:endParaRPr lang="ko-KR" altLang="en-US" sz="1800">
-              <a:latin typeface="맑은 고딕" charset="0"/>
-              <a:ea typeface="맑은 고딕" charset="0"/>
-            </a:endParaRPr>
-          </a:p>
-        </p:txBody>
-      </p:sp>
-      <p:sp>
-        <p:nvSpPr>
-          <p:cNvPr id="33" name="Rect 0"/>
-          <p:cNvSpPr txBox="1">
-            <a:spLocks/>
-          </p:cNvSpPr>
-          <p:nvPr/>
-        </p:nvSpPr>
-        <p:spPr>
-          <a:xfrm rot="0">
-            <a:off x="6800215" y="5461000"/>
-            <a:ext cx="4206875" cy="677545"/>
-          </a:xfrm>
-          <a:prstGeom prst="rect"/>
-          <a:noFill/>
-          <a:ln w="0">
-            <a:noFill/>
-            <a:prstDash/>
-          </a:ln>
-        </p:spPr>
-        <p:txBody>
-          <a:bodyPr wrap="square" lIns="89535" tIns="46355" rIns="89535" bIns="46355" numCol="1" vert="horz" anchor="t">
-            <a:spAutoFit/>
-          </a:bodyPr>
-          <a:lstStyle/>
-          <a:p>
-            <a:pPr marL="0" indent="0" rtl="0" algn="l" defTabSz="914400" eaLnBrk="1" latinLnBrk="0" hangingPunct="1">
-              <a:buFontTx/>
-              <a:buNone/>
-            </a:pPr>
-            <a:r>
-              <a:rPr lang="ko-KR" sz="2000" b="1">
-                <a:solidFill>
-                  <a:srgbClr val="0611F2"/>
-                </a:solidFill>
-                <a:latin typeface="맑은 고딕" charset="0"/>
-                <a:ea typeface="맑은 고딕" charset="0"/>
-              </a:rPr>
-              <a:t>8</a:t>
-            </a:r>
-            <a:r>
-              <a:rPr sz="2000" b="1">
-                <a:solidFill>
-                  <a:srgbClr val="0611F2"/>
-                </a:solidFill>
-                <a:latin typeface="맑은 고딕" charset="0"/>
-                <a:ea typeface="맑은 고딕" charset="0"/>
-              </a:rPr>
-              <a:t>. </a:t>
-            </a:r>
-            <a:r>
-              <a:rPr lang="ko-KR" sz="1800">
-                <a:latin typeface="맑은 고딕" charset="0"/>
-                <a:ea typeface="맑은 고딕" charset="0"/>
-              </a:rPr>
-              <a:t>그런 다음 UI에서 Scroll View를 생성합니다.</a:t>
-            </a:r>
-            <a:endParaRPr lang="ko-KR" altLang="en-US" sz="1800">
-              <a:latin typeface="맑은 고딕" charset="0"/>
-              <a:ea typeface="맑은 고딕" charset="0"/>
-            </a:endParaRPr>
-          </a:p>
         </p:txBody>
       </p:sp>
       <p:pic>
         <p:nvPicPr>
-          <p:cNvPr id="37" name="그림 49"/>
-          <p:cNvPicPr>
-            <a:picLocks noChangeAspect="1"/>
-          </p:cNvPicPr>
-          <p:nvPr/>
-        </p:nvPicPr>
-        <p:blipFill rotWithShape="1">
-          <a:blip r:embed="rId2" cstate="print">
-            <a:extLst>
-              <a:ext uri="{28A0092B-C50C-407E-A947-70E740481C1C}">
-                <a14:useLocalDpi xmlns:a14="http://schemas.microsoft.com/office/drawing/2010/main" val="0"/>
-              </a:ext>
-            </a:extLst>
-          </a:blip>
-          <a:stretch>
-            <a:fillRect/>
-          </a:stretch>
-        </p:blipFill>
-        <p:spPr>
-          <a:xfrm rot="0">
-            <a:off x="4031615" y="1704340"/>
-            <a:ext cx="1339215" cy="2003425"/>
-          </a:xfrm>
-          <a:prstGeom prst="roundRect"/>
-          <a:solidFill>
-            <a:srgbClr val="EDEDED"/>
-          </a:solidFill>
-        </p:spPr>
-      </p:pic>
-      <p:pic>
-        <p:nvPicPr>
-          <p:cNvPr id="38" name="그림 55"/>
-          <p:cNvPicPr>
-            <a:picLocks noChangeAspect="1"/>
-          </p:cNvPicPr>
-          <p:nvPr/>
-        </p:nvPicPr>
-        <p:blipFill rotWithShape="1">
-          <a:blip r:embed="rId3" cstate="hqprint">
-            <a:extLst>
-              <a:ext uri="{28A0092B-C50C-407E-A947-70E740481C1C}">
-                <a14:useLocalDpi xmlns:a14="http://schemas.microsoft.com/office/drawing/2010/main"/>
-              </a:ext>
-            </a:extLst>
-          </a:blip>
-          <a:stretch>
-            <a:fillRect/>
-          </a:stretch>
-        </p:blipFill>
-        <p:spPr>
-          <a:xfrm rot="0">
-            <a:off x="1210310" y="1259205"/>
-            <a:ext cx="2647950" cy="2906395"/>
-          </a:xfrm>
-          <a:prstGeom prst="roundRect"/>
-          <a:solidFill>
-            <a:srgbClr val="EDEDED"/>
-          </a:solidFill>
-        </p:spPr>
-      </p:pic>
-      <p:pic>
-        <p:nvPicPr>
-          <p:cNvPr id="39" name="그림 56"/>
-          <p:cNvPicPr>
-            <a:picLocks noChangeAspect="1"/>
-          </p:cNvPicPr>
-          <p:nvPr/>
-        </p:nvPicPr>
-        <p:blipFill rotWithShape="1">
-          <a:blip r:embed="rId4" cstate="print">
-            <a:extLst>
-              <a:ext uri="{28A0092B-C50C-407E-A947-70E740481C1C}">
-                <a14:useLocalDpi xmlns:a14="http://schemas.microsoft.com/office/drawing/2010/main" val="0"/>
-              </a:ext>
-            </a:extLst>
-          </a:blip>
-          <a:stretch>
-            <a:fillRect/>
-          </a:stretch>
-        </p:blipFill>
-        <p:spPr>
-          <a:xfrm rot="0">
-            <a:off x="9518015" y="1877695"/>
-            <a:ext cx="1486535" cy="2853055"/>
-          </a:xfrm>
-          <a:prstGeom prst="roundRect"/>
-          <a:solidFill>
-            <a:srgbClr val="EDEDED"/>
-          </a:solidFill>
-        </p:spPr>
-      </p:pic>
-      <p:pic>
-        <p:nvPicPr>
-          <p:cNvPr id="40" name="그림 60"/>
+          <p:cNvPr id="42" name="그림 24" descr="C:/Users/Admin1/AppData/Roaming/PolarisOffice/ETemp/20796_18072784/fImage21749216491.png"/>
           <p:cNvPicPr>
             <a:picLocks noChangeAspect="1"/>
           </p:cNvPicPr>
@@ -10706,8 +10807,8 @@
         </p:blipFill>
         <p:spPr>
           <a:xfrm rot="0">
-            <a:off x="6810375" y="1255395"/>
-            <a:ext cx="2467610" cy="4074160"/>
+            <a:off x="1149350" y="1388110"/>
+            <a:ext cx="2683510" cy="3824605"/>
           </a:xfrm>
           <a:prstGeom prst="roundRect"/>
           <a:solidFill>
@@ -10715,6 +10816,252 @@
           </a:solidFill>
         </p:spPr>
       </p:pic>
+      <p:pic>
+        <p:nvPicPr>
+          <p:cNvPr id="43" name="그림 25" descr="C:/Users/Admin1/AppData/Roaming/PolarisOffice/ETemp/20796_18072784/fImage92132065724.png"/>
+          <p:cNvPicPr>
+            <a:picLocks noChangeAspect="1"/>
+          </p:cNvPicPr>
+          <p:nvPr/>
+        </p:nvPicPr>
+        <p:blipFill rotWithShape="1">
+          <a:blip r:embed="rId7" cstate="print">
+            <a:extLst>
+              <a:ext uri="{28A0092B-C50C-407E-A947-70E740481C1C}">
+                <a14:useLocalDpi xmlns:a14="http://schemas.microsoft.com/office/drawing/2010/main" val="0"/>
+              </a:ext>
+            </a:extLst>
+          </a:blip>
+          <a:stretch>
+            <a:fillRect/>
+          </a:stretch>
+        </p:blipFill>
+        <p:spPr>
+          <a:xfrm rot="0">
+            <a:off x="3982085" y="2094865"/>
+            <a:ext cx="1372235" cy="2402840"/>
+          </a:xfrm>
+          <a:prstGeom prst="roundRect"/>
+          <a:solidFill>
+            <a:srgbClr val="EDEDED"/>
+          </a:solidFill>
+        </p:spPr>
+      </p:pic>
+      <p:pic>
+        <p:nvPicPr>
+          <p:cNvPr id="44" name="그림 32" descr="C:/Users/Admin1/AppData/Roaming/PolarisOffice/ETemp/20796_18072784/fImage121602091478.png"/>
+          <p:cNvPicPr>
+            <a:picLocks noChangeAspect="1"/>
+          </p:cNvPicPr>
+          <p:nvPr/>
+        </p:nvPicPr>
+        <p:blipFill rotWithShape="1">
+          <a:blip r:embed="rId8" cstate="print">
+            <a:extLst>
+              <a:ext uri="{28A0092B-C50C-407E-A947-70E740481C1C}">
+                <a14:useLocalDpi xmlns:a14="http://schemas.microsoft.com/office/drawing/2010/main" val="0"/>
+              </a:ext>
+            </a:extLst>
+          </a:blip>
+          <a:stretch>
+            <a:fillRect/>
+          </a:stretch>
+        </p:blipFill>
+        <p:spPr>
+          <a:xfrm rot="0">
+            <a:off x="6808470" y="1388110"/>
+            <a:ext cx="1563370" cy="1829435"/>
+          </a:xfrm>
+          <a:prstGeom prst="roundRect"/>
+          <a:solidFill>
+            <a:srgbClr val="EDEDED"/>
+          </a:solidFill>
+        </p:spPr>
+      </p:pic>
+      <p:pic>
+        <p:nvPicPr>
+          <p:cNvPr id="45" name="그림 35" descr="C:/Users/Admin1/AppData/Roaming/PolarisOffice/ETemp/20796_18072784/fImage54982324827.png"/>
+          <p:cNvPicPr>
+            <a:picLocks noChangeAspect="1"/>
+          </p:cNvPicPr>
+          <p:nvPr/>
+        </p:nvPicPr>
+        <p:blipFill rotWithShape="1">
+          <a:blip r:embed="rId9" cstate="hqprint">
+            <a:extLst>
+              <a:ext uri="{28A0092B-C50C-407E-A947-70E740481C1C}">
+                <a14:useLocalDpi xmlns:a14="http://schemas.microsoft.com/office/drawing/2010/main"/>
+              </a:ext>
+            </a:extLst>
+          </a:blip>
+          <a:stretch>
+            <a:fillRect/>
+          </a:stretch>
+        </p:blipFill>
+        <p:spPr>
+          <a:xfrm rot="0">
+            <a:off x="8495665" y="1389380"/>
+            <a:ext cx="2444750" cy="855980"/>
+          </a:xfrm>
+          <a:prstGeom prst="roundRect"/>
+          <a:solidFill>
+            <a:srgbClr val="EDEDED"/>
+          </a:solidFill>
+        </p:spPr>
+      </p:pic>
+      <p:pic>
+        <p:nvPicPr>
+          <p:cNvPr id="46" name="그림 36" descr="C:/Users/Admin1/AppData/Roaming/PolarisOffice/ETemp/20796_18072784/fImage50872335436.png"/>
+          <p:cNvPicPr>
+            <a:picLocks noChangeAspect="1"/>
+          </p:cNvPicPr>
+          <p:nvPr/>
+        </p:nvPicPr>
+        <p:blipFill rotWithShape="1">
+          <a:blip r:embed="rId10" cstate="hqprint">
+            <a:extLst>
+              <a:ext uri="{28A0092B-C50C-407E-A947-70E740481C1C}">
+                <a14:useLocalDpi xmlns:a14="http://schemas.microsoft.com/office/drawing/2010/main"/>
+              </a:ext>
+            </a:extLst>
+          </a:blip>
+          <a:stretch>
+            <a:fillRect/>
+          </a:stretch>
+        </p:blipFill>
+        <p:spPr>
+          <a:xfrm rot="0">
+            <a:off x="8496300" y="2377440"/>
+            <a:ext cx="2439670" cy="840740"/>
+          </a:xfrm>
+          <a:prstGeom prst="roundRect"/>
+          <a:solidFill>
+            <a:srgbClr val="EDEDED"/>
+          </a:solidFill>
+        </p:spPr>
+      </p:pic>
+      <p:pic>
+        <p:nvPicPr>
+          <p:cNvPr id="47" name="그림 37" descr="C:/Users/Admin1/AppData/Roaming/PolarisOffice/ETemp/20796_18072784/fImage66722354604.png"/>
+          <p:cNvPicPr>
+            <a:picLocks noChangeAspect="1"/>
+          </p:cNvPicPr>
+          <p:nvPr/>
+        </p:nvPicPr>
+        <p:blipFill rotWithShape="1">
+          <a:blip r:embed="rId11" cstate="hqprint">
+            <a:extLst>
+              <a:ext uri="{28A0092B-C50C-407E-A947-70E740481C1C}">
+                <a14:useLocalDpi xmlns:a14="http://schemas.microsoft.com/office/drawing/2010/main"/>
+              </a:ext>
+            </a:extLst>
+          </a:blip>
+          <a:stretch>
+            <a:fillRect/>
+          </a:stretch>
+        </p:blipFill>
+        <p:spPr>
+          <a:xfrm rot="0">
+            <a:off x="6811010" y="3349625"/>
+            <a:ext cx="4137660" cy="873760"/>
+          </a:xfrm>
+          <a:prstGeom prst="roundRect"/>
+          <a:solidFill>
+            <a:srgbClr val="EDEDED"/>
+          </a:solidFill>
+        </p:spPr>
+      </p:pic>
+      <p:sp>
+        <p:nvSpPr>
+          <p:cNvPr id="48" name="텍스트 상자 38"/>
+          <p:cNvSpPr txBox="1">
+            <a:spLocks/>
+          </p:cNvSpPr>
+          <p:nvPr/>
+        </p:nvSpPr>
+        <p:spPr>
+          <a:xfrm rot="0">
+            <a:off x="6807835" y="4350385"/>
+            <a:ext cx="4141470" cy="1784985"/>
+          </a:xfrm>
+          <a:prstGeom prst="rect"/>
+          <a:noFill/>
+          <a:ln w="0">
+            <a:noFill/>
+            <a:prstDash/>
+          </a:ln>
+        </p:spPr>
+        <p:txBody>
+          <a:bodyPr wrap="square" lIns="89535" tIns="46355" rIns="89535" bIns="46355" numCol="1" vert="horz" anchor="t">
+            <a:spAutoFit/>
+          </a:bodyPr>
+          <a:lstStyle/>
+          <a:p>
+            <a:pPr marL="0" indent="0" rtl="0" algn="l" defTabSz="914400" eaLnBrk="1" latinLnBrk="0" hangingPunct="1">
+              <a:buFontTx/>
+              <a:buNone/>
+            </a:pPr>
+            <a:r>
+              <a:rPr lang="ko-KR" sz="2000" b="1">
+                <a:solidFill>
+                  <a:srgbClr val="0611F2"/>
+                </a:solidFill>
+                <a:latin typeface="맑은 고딕" charset="0"/>
+                <a:ea typeface="맑은 고딕" charset="0"/>
+              </a:rPr>
+              <a:t>9</a:t>
+            </a:r>
+            <a:r>
+              <a:rPr sz="2000" b="1">
+                <a:solidFill>
+                  <a:srgbClr val="0611F2"/>
+                </a:solidFill>
+                <a:latin typeface="맑은 고딕" charset="0"/>
+                <a:ea typeface="맑은 고딕" charset="0"/>
+              </a:rPr>
+              <a:t>. </a:t>
+            </a:r>
+            <a:r>
+              <a:rPr lang="ko-KR" sz="1800">
+                <a:latin typeface="맑은 고딕" charset="0"/>
+                <a:ea typeface="맑은 고딕" charset="0"/>
+              </a:rPr>
+              <a:t>이제 Content 오브젝트에 Vertical Layout Group 컴포넌트와 Content Size Fitter 컴포넌트를 추가합니다.</a:t>
+            </a:r>
+            <a:endParaRPr lang="ko-KR" altLang="en-US" sz="1800">
+              <a:latin typeface="맑은 고딕" charset="0"/>
+              <a:ea typeface="맑은 고딕" charset="0"/>
+            </a:endParaRPr>
+          </a:p>
+          <a:p>
+            <a:pPr marL="0" indent="0" rtl="0" algn="l" defTabSz="914400" eaLnBrk="1" latinLnBrk="0" hangingPunct="1">
+              <a:buFontTx/>
+              <a:buNone/>
+            </a:pPr>
+            <a:endParaRPr lang="ko-KR" altLang="en-US" sz="1800">
+              <a:latin typeface="맑은 고딕" charset="0"/>
+              <a:ea typeface="맑은 고딕" charset="0"/>
+            </a:endParaRPr>
+          </a:p>
+          <a:p>
+            <a:pPr marL="0" indent="0" rtl="0" algn="l" defTabSz="914400" eaLnBrk="1" latinLnBrk="0" hangingPunct="1">
+              <a:buFontTx/>
+              <a:buNone/>
+            </a:pPr>
+            <a:r>
+              <a:rPr lang="ko-KR" sz="1800">
+                <a:latin typeface="맑은 고딕" charset="0"/>
+                <a:ea typeface="맑은 고딕" charset="0"/>
+              </a:rPr>
+              <a:t>그런 다음 Content Size Fitter의 Vertical Fit을 Min Size로 설정합니다.</a:t>
+            </a:r>
+            <a:endParaRPr lang="ko-KR" altLang="en-US" sz="1800">
+              <a:latin typeface="맑은 고딕" charset="0"/>
+              <a:ea typeface="맑은 고딕" charset="0"/>
+            </a:endParaRPr>
+          </a:p>
+        </p:txBody>
+      </p:sp>
     </p:spTree>
   </p:cSld>
   <p:clrMapOvr>
@@ -10808,7 +11155,7 @@
       </p:sp>
       <p:sp>
         <p:nvSpPr>
-          <p:cNvPr id="24" name="Rect 0"/>
+          <p:cNvPr id="33" name="Rect 0"/>
           <p:cNvSpPr txBox="1">
             <a:spLocks/>
           </p:cNvSpPr>
@@ -10816,8 +11163,8 @@
         </p:nvSpPr>
         <p:spPr>
           <a:xfrm rot="0">
-            <a:off x="1229995" y="4367530"/>
-            <a:ext cx="4191000" cy="1784985"/>
+            <a:off x="1230630" y="4388485"/>
+            <a:ext cx="4131945" cy="1784985"/>
           </a:xfrm>
           <a:prstGeom prst="rect"/>
           <a:noFill/>
@@ -10844,7 +11191,7 @@
                 <a:latin typeface="맑은 고딕" charset="0"/>
                 <a:ea typeface="맑은 고딕" charset="0"/>
               </a:rPr>
-              <a:t>9</a:t>
+              <a:t>10</a:t>
             </a:r>
             <a:r>
               <a:rPr sz="2000" b="1">
@@ -10861,7 +11208,7 @@
                 <a:latin typeface="맑은 고딕" charset="0"/>
                 <a:ea typeface="맑은 고딕" charset="0"/>
               </a:rPr>
-              <a:t>이제 Content 오브젝트에 Vertical Layout Group 컴포넌트와 Content Size Fitter 컴포넌트를 추가합니다.</a:t>
+              <a:t>그리고 UI에서 Button을 생성하고 Room이라는 이름으로 정의합니다.</a:t>
             </a:r>
             <a:endParaRPr lang="ko-KR" altLang="en-US" sz="1800">
               <a:latin typeface="맑은 고딕" charset="0"/>
@@ -10888,7 +11235,7 @@
                 <a:latin typeface="맑은 고딕" charset="0"/>
                 <a:ea typeface="맑은 고딕" charset="0"/>
               </a:rPr>
-              <a:t>그런 다음 Content Size Fitter의 Vertical Fit을 Min Size로 설정합니다.</a:t>
+              <a:t>그다음으로 Infomation 스크립트를 생성하고 Room 오브젝트에 넣어줍니다.</a:t>
             </a:r>
             <a:endParaRPr lang="ko-KR" altLang="en-US" sz="1800">
               <a:latin typeface="맑은 고딕" charset="0"/>
@@ -10897,100 +11244,9 @@
           </a:p>
         </p:txBody>
       </p:sp>
-      <p:sp>
-        <p:nvSpPr>
-          <p:cNvPr id="33" name="Rect 0"/>
-          <p:cNvSpPr txBox="1">
-            <a:spLocks/>
-          </p:cNvSpPr>
-          <p:nvPr/>
-        </p:nvSpPr>
-        <p:spPr>
-          <a:xfrm rot="0">
-            <a:off x="6833235" y="4363720"/>
-            <a:ext cx="4206875" cy="1784985"/>
-          </a:xfrm>
-          <a:prstGeom prst="rect"/>
-          <a:noFill/>
-          <a:ln w="0">
-            <a:noFill/>
-            <a:prstDash/>
-          </a:ln>
-        </p:spPr>
-        <p:txBody>
-          <a:bodyPr wrap="square" lIns="89535" tIns="46355" rIns="89535" bIns="46355" numCol="1" vert="horz" anchor="t">
-            <a:spAutoFit/>
-          </a:bodyPr>
-          <a:lstStyle/>
-          <a:p>
-            <a:pPr marL="0" indent="0" rtl="0" algn="l" defTabSz="914400" eaLnBrk="1" latinLnBrk="0" hangingPunct="1">
-              <a:buFontTx/>
-              <a:buNone/>
-            </a:pPr>
-            <a:r>
-              <a:rPr lang="ko-KR" sz="2000" b="1">
-                <a:solidFill>
-                  <a:srgbClr val="0611F2"/>
-                </a:solidFill>
-                <a:latin typeface="맑은 고딕" charset="0"/>
-                <a:ea typeface="맑은 고딕" charset="0"/>
-              </a:rPr>
-              <a:t>10</a:t>
-            </a:r>
-            <a:r>
-              <a:rPr sz="2000" b="1">
-                <a:solidFill>
-                  <a:srgbClr val="0611F2"/>
-                </a:solidFill>
-                <a:latin typeface="맑은 고딕" charset="0"/>
-                <a:ea typeface="맑은 고딕" charset="0"/>
-              </a:rPr>
-              <a:t>. </a:t>
-            </a:r>
-            <a:r>
-              <a:rPr lang="ko-KR" sz="1800">
-                <a:latin typeface="맑은 고딕" charset="0"/>
-                <a:ea typeface="맑은 고딕" charset="0"/>
-              </a:rPr>
-              <a:t>그리고 UI에서 Button을 생성하고 Room이라는 이름으로 정의합니다.</a:t>
-            </a:r>
-            <a:endParaRPr lang="ko-KR" altLang="en-US" sz="1800">
-              <a:latin typeface="맑은 고딕" charset="0"/>
-              <a:ea typeface="맑은 고딕" charset="0"/>
-            </a:endParaRPr>
-          </a:p>
-          <a:p>
-            <a:pPr marL="0" indent="0" rtl="0" algn="l" defTabSz="914400" eaLnBrk="1" latinLnBrk="0" hangingPunct="1">
-              <a:buFontTx/>
-              <a:buNone/>
-            </a:pPr>
-            <a:endParaRPr lang="ko-KR" altLang="en-US" sz="1800">
-              <a:latin typeface="맑은 고딕" charset="0"/>
-              <a:ea typeface="맑은 고딕" charset="0"/>
-            </a:endParaRPr>
-          </a:p>
-          <a:p>
-            <a:pPr marL="0" indent="0" rtl="0" algn="l" defTabSz="914400" eaLnBrk="1" latinLnBrk="0" hangingPunct="1">
-              <a:buFontTx/>
-              <a:buNone/>
-            </a:pPr>
-            <a:r>
-              <a:rPr lang="ko-KR" sz="1800">
-                <a:latin typeface="맑은 고딕" charset="0"/>
-                <a:ea typeface="맑은 고딕" charset="0"/>
-              </a:rPr>
-              <a:t>그다음으로 Infomation 스크립트를 생성하고 Room 오브젝트에 넣어줍니다.</a:t>
-            </a:r>
-            <a:endParaRPr lang="ko-KR" altLang="en-US" sz="1800">
-              <a:latin typeface="맑은 고딕" charset="0"/>
-              <a:ea typeface="맑은 고딕" charset="0"/>
-            </a:endParaRPr>
-          </a:p>
-        </p:txBody>
-      </p:sp>
       <p:pic>
         <p:nvPicPr>
-          <p:cNvPr id="42" name="그림 69"/>
+          <p:cNvPr id="42" name="그림 69" descr="C:/Users/Admin1/AppData/Roaming/PolarisOffice/ETemp/20796_18072784/fImage191382302995.png"/>
           <p:cNvPicPr>
             <a:picLocks noChangeAspect="1"/>
           </p:cNvPicPr>
@@ -11010,8 +11266,8 @@
         </p:blipFill>
         <p:spPr>
           <a:xfrm rot="0">
-            <a:off x="6824980" y="1263650"/>
-            <a:ext cx="2577465" cy="2976880"/>
+            <a:off x="1238885" y="1371600"/>
+            <a:ext cx="2635885" cy="2851785"/>
           </a:xfrm>
           <a:prstGeom prst="roundRect"/>
           <a:solidFill>
@@ -11021,17 +11277,17 @@
       </p:pic>
       <p:pic>
         <p:nvPicPr>
-          <p:cNvPr id="43" name="그림 70"/>
+          <p:cNvPr id="48" name="그림 85" descr="C:/Users/Admin1/AppData/Roaming/PolarisOffice/ETemp/20796_18072784/fImage20932483902.png"/>
           <p:cNvPicPr>
             <a:picLocks noChangeAspect="1"/>
           </p:cNvPicPr>
           <p:nvPr/>
         </p:nvPicPr>
         <p:blipFill rotWithShape="1">
-          <a:blip r:embed="rId3" cstate="print">
+          <a:blip r:embed="rId8" cstate="hqprint">
             <a:extLst>
               <a:ext uri="{28A0092B-C50C-407E-A947-70E740481C1C}">
-                <a14:useLocalDpi xmlns:a14="http://schemas.microsoft.com/office/drawing/2010/main" val="0"/>
+                <a14:useLocalDpi xmlns:a14="http://schemas.microsoft.com/office/drawing/2010/main"/>
               </a:ext>
             </a:extLst>
           </a:blip>
@@ -11041,163 +11297,8 @@
         </p:blipFill>
         <p:spPr>
           <a:xfrm rot="0">
-            <a:off x="9576435" y="1272540"/>
-            <a:ext cx="1432560" cy="1878965"/>
-          </a:xfrm>
-          <a:prstGeom prst="roundRect"/>
-          <a:solidFill>
-            <a:srgbClr val="EDEDED"/>
-          </a:solidFill>
-        </p:spPr>
-      </p:pic>
-      <p:pic>
-        <p:nvPicPr>
-          <p:cNvPr id="44" name="그림 73"/>
-          <p:cNvPicPr>
-            <a:picLocks noChangeAspect="1"/>
-          </p:cNvPicPr>
-          <p:nvPr/>
-        </p:nvPicPr>
-        <p:blipFill rotWithShape="1">
-          <a:blip r:embed="rId4" cstate="print">
-            <a:extLst>
-              <a:ext uri="{28A0092B-C50C-407E-A947-70E740481C1C}">
-                <a14:useLocalDpi xmlns:a14="http://schemas.microsoft.com/office/drawing/2010/main" val="0"/>
-              </a:ext>
-            </a:extLst>
-          </a:blip>
-          <a:stretch>
-            <a:fillRect/>
-          </a:stretch>
-        </p:blipFill>
-        <p:spPr>
-          <a:xfrm rot="0">
-            <a:off x="3001010" y="1256665"/>
-            <a:ext cx="2423795" cy="971550"/>
-          </a:xfrm>
-          <a:prstGeom prst="roundRect"/>
-          <a:solidFill>
-            <a:srgbClr val="EDEDED"/>
-          </a:solidFill>
-        </p:spPr>
-      </p:pic>
-      <p:pic>
-        <p:nvPicPr>
-          <p:cNvPr id="45" name="그림 76"/>
-          <p:cNvPicPr>
-            <a:picLocks noChangeAspect="1"/>
-          </p:cNvPicPr>
-          <p:nvPr/>
-        </p:nvPicPr>
-        <p:blipFill rotWithShape="1">
-          <a:blip r:embed="rId5" cstate="print">
-            <a:extLst>
-              <a:ext uri="{28A0092B-C50C-407E-A947-70E740481C1C}">
-                <a14:useLocalDpi xmlns:a14="http://schemas.microsoft.com/office/drawing/2010/main" val="0"/>
-              </a:ext>
-            </a:extLst>
-          </a:blip>
-          <a:stretch>
-            <a:fillRect/>
-          </a:stretch>
-        </p:blipFill>
-        <p:spPr>
-          <a:xfrm rot="0">
-            <a:off x="3001645" y="2360930"/>
-            <a:ext cx="2419350" cy="981710"/>
-          </a:xfrm>
-          <a:prstGeom prst="roundRect"/>
-          <a:solidFill>
-            <a:srgbClr val="EDEDED"/>
-          </a:solidFill>
-        </p:spPr>
-      </p:pic>
-      <p:pic>
-        <p:nvPicPr>
-          <p:cNvPr id="46" name="그림 79"/>
-          <p:cNvPicPr>
-            <a:picLocks noChangeAspect="1"/>
-          </p:cNvPicPr>
-          <p:nvPr/>
-        </p:nvPicPr>
-        <p:blipFill rotWithShape="1">
-          <a:blip r:embed="rId6" cstate="print">
-            <a:extLst>
-              <a:ext uri="{28A0092B-C50C-407E-A947-70E740481C1C}">
-                <a14:useLocalDpi xmlns:a14="http://schemas.microsoft.com/office/drawing/2010/main" val="0"/>
-              </a:ext>
-            </a:extLst>
-          </a:blip>
-          <a:stretch>
-            <a:fillRect/>
-          </a:stretch>
-        </p:blipFill>
-        <p:spPr>
-          <a:xfrm rot="0">
-            <a:off x="1242060" y="1272540"/>
-            <a:ext cx="1560195" cy="2059940"/>
-          </a:xfrm>
-          <a:prstGeom prst="roundRect"/>
-          <a:solidFill>
-            <a:srgbClr val="EDEDED"/>
-          </a:solidFill>
-        </p:spPr>
-      </p:pic>
-      <p:pic>
-        <p:nvPicPr>
-          <p:cNvPr id="47" name="그림 82"/>
-          <p:cNvPicPr>
-            <a:picLocks noChangeAspect="1"/>
-          </p:cNvPicPr>
-          <p:nvPr/>
-        </p:nvPicPr>
-        <p:blipFill rotWithShape="1">
-          <a:blip r:embed="rId7" cstate="print">
-            <a:extLst>
-              <a:ext uri="{28A0092B-C50C-407E-A947-70E740481C1C}">
-                <a14:useLocalDpi xmlns:a14="http://schemas.microsoft.com/office/drawing/2010/main" val="0"/>
-              </a:ext>
-            </a:extLst>
-          </a:blip>
-          <a:stretch>
-            <a:fillRect/>
-          </a:stretch>
-        </p:blipFill>
-        <p:spPr>
-          <a:xfrm rot="0">
-            <a:off x="1241425" y="3491230"/>
-            <a:ext cx="4179570" cy="815340"/>
-          </a:xfrm>
-          <a:prstGeom prst="roundRect"/>
-          <a:solidFill>
-            <a:srgbClr val="EDEDED"/>
-          </a:solidFill>
-        </p:spPr>
-      </p:pic>
-      <p:pic>
-        <p:nvPicPr>
-          <p:cNvPr id="48" name="그림 85"/>
-          <p:cNvPicPr>
-            <a:picLocks noChangeAspect="1"/>
-          </p:cNvPicPr>
-          <p:nvPr/>
-        </p:nvPicPr>
-        <p:blipFill rotWithShape="1">
-          <a:blip r:embed="rId8" cstate="print">
-            <a:extLst>
-              <a:ext uri="{28A0092B-C50C-407E-A947-70E740481C1C}">
-                <a14:useLocalDpi xmlns:a14="http://schemas.microsoft.com/office/drawing/2010/main" val="0"/>
-              </a:ext>
-            </a:extLst>
-          </a:blip>
-          <a:stretch>
-            <a:fillRect/>
-          </a:stretch>
-        </p:blipFill>
-        <p:spPr>
-          <a:xfrm rot="0">
-            <a:off x="9975850" y="3451225"/>
-            <a:ext cx="657225" cy="780415"/>
+            <a:off x="4389120" y="3516630"/>
+            <a:ext cx="657860" cy="706755"/>
           </a:xfrm>
           <a:prstGeom prst="roundRect"/>
           <a:solidFill>
@@ -11210,18 +11311,18 @@
           <p:cNvPr id="49" name="도형 88"/>
           <p:cNvCxnSpPr>
             <a:stCxn id="48" idx="0"/>
+            <a:endCxn id="50" idx="2"/>
           </p:cNvCxnSpPr>
           <p:nvPr/>
         </p:nvCxnSpPr>
         <p:spPr>
-          <a:xfrm rot="0" flipH="1" flipV="1">
-            <a:off x="10299700" y="2684780"/>
-            <a:ext cx="5080" cy="767080"/>
+          <a:xfrm rot="0" flipV="1">
+            <a:off x="4717415" y="3092450"/>
+            <a:ext cx="8890" cy="424815"/>
           </a:xfrm>
           <a:prstGeom prst="straightConnector1"/>
           <a:ln w="6350" cap="flat" cmpd="sng">
             <a:prstDash/>
-            <a:headEnd type="none" w="med" len="med"/>
             <a:tailEnd type="triangle" w="med" len="med"/>
           </a:ln>
         </p:spPr>
@@ -11240,6 +11341,292 @@
           </a:fontRef>
         </p:style>
       </p:cxnSp>
+      <p:pic>
+        <p:nvPicPr>
+          <p:cNvPr id="50" name="그림 39" descr="C:/Users/Admin1/AppData/Roaming/PolarisOffice/ETemp/20796_18072784/fImage126762149358.png"/>
+          <p:cNvPicPr>
+            <a:picLocks noChangeAspect="1"/>
+          </p:cNvPicPr>
+          <p:nvPr/>
+        </p:nvPicPr>
+        <p:blipFill rotWithShape="1">
+          <a:blip r:embed="rId10" cstate="print">
+            <a:extLst>
+              <a:ext uri="{28A0092B-C50C-407E-A947-70E740481C1C}">
+                <a14:useLocalDpi xmlns:a14="http://schemas.microsoft.com/office/drawing/2010/main" val="0"/>
+              </a:ext>
+            </a:extLst>
+          </a:blip>
+          <a:stretch>
+            <a:fillRect/>
+          </a:stretch>
+        </p:blipFill>
+        <p:spPr>
+          <a:xfrm rot="0">
+            <a:off x="4090035" y="1371600"/>
+            <a:ext cx="1272540" cy="1721485"/>
+          </a:xfrm>
+          <a:prstGeom prst="roundRect"/>
+          <a:solidFill>
+            <a:srgbClr val="EDEDED"/>
+          </a:solidFill>
+        </p:spPr>
+      </p:pic>
+      <p:pic>
+        <p:nvPicPr>
+          <p:cNvPr id="51" name="그림 42" descr="C:/Users/Admin1/AppData/Roaming/PolarisOffice/ETemp/20796_18072784/fImage375602156962.png"/>
+          <p:cNvPicPr>
+            <a:picLocks noChangeAspect="1"/>
+          </p:cNvPicPr>
+          <p:nvPr/>
+        </p:nvPicPr>
+        <p:blipFill rotWithShape="1">
+          <a:blip r:embed="rId11" cstate="print">
+            <a:extLst>
+              <a:ext uri="{28A0092B-C50C-407E-A947-70E740481C1C}">
+                <a14:useLocalDpi xmlns:a14="http://schemas.microsoft.com/office/drawing/2010/main" val="0"/>
+              </a:ext>
+            </a:extLst>
+          </a:blip>
+          <a:stretch>
+            <a:fillRect/>
+          </a:stretch>
+        </p:blipFill>
+        <p:spPr>
+          <a:xfrm rot="0">
+            <a:off x="6824980" y="1371600"/>
+            <a:ext cx="4132580" cy="1363980"/>
+          </a:xfrm>
+          <a:prstGeom prst="roundRect"/>
+          <a:solidFill>
+            <a:srgbClr val="EDEDED"/>
+          </a:solidFill>
+        </p:spPr>
+      </p:pic>
+      <p:sp>
+        <p:nvSpPr>
+          <p:cNvPr id="52" name="텍스트 상자 45"/>
+          <p:cNvSpPr txBox="1">
+            <a:spLocks/>
+          </p:cNvSpPr>
+          <p:nvPr/>
+        </p:nvSpPr>
+        <p:spPr>
+          <a:xfrm rot="0">
+            <a:off x="6816725" y="2859405"/>
+            <a:ext cx="4131945" cy="861695"/>
+          </a:xfrm>
+          <a:prstGeom prst="rect"/>
+          <a:noFill/>
+        </p:spPr>
+        <p:txBody>
+          <a:bodyPr wrap="square" lIns="0" tIns="0" rIns="0" bIns="0" vert="horz" anchor="t">
+            <a:noAutofit/>
+          </a:bodyPr>
+          <a:lstStyle/>
+          <a:p>
+            <a:pPr marL="0" indent="0" rtl="0" algn="l" defTabSz="914400" eaLnBrk="1" latinLnBrk="0" hangingPunct="1">
+              <a:buFontTx/>
+              <a:buNone/>
+            </a:pPr>
+            <a:r>
+              <a:rPr lang="ko-KR" sz="2000" b="1">
+                <a:solidFill>
+                  <a:srgbClr val="0611F2"/>
+                </a:solidFill>
+                <a:latin typeface="맑은 고딕" charset="0"/>
+                <a:ea typeface="맑은 고딕" charset="0"/>
+              </a:rPr>
+              <a:t>11</a:t>
+            </a:r>
+            <a:r>
+              <a:rPr sz="2000" b="1">
+                <a:solidFill>
+                  <a:srgbClr val="0611F2"/>
+                </a:solidFill>
+                <a:latin typeface="맑은 고딕" charset="0"/>
+                <a:ea typeface="맑은 고딕" charset="0"/>
+              </a:rPr>
+              <a:t>. </a:t>
+            </a:r>
+            <a:r>
+              <a:rPr lang="ko-KR" sz="1800">
+                <a:latin typeface="맑은 고딕" charset="0"/>
+                <a:ea typeface="맑은 고딕" charset="0"/>
+              </a:rPr>
+              <a:t>마지막으로</a:t>
+            </a:r>
+            <a:r>
+              <a:rPr lang="ko-KR" sz="1800">
+                <a:latin typeface="맑은 고딕" charset="0"/>
+                <a:ea typeface="맑은 고딕" charset="0"/>
+              </a:rPr>
+              <a:t> Infomation 스크립트에서 텍스트 변수</a:t>
+            </a:r>
+            <a:r>
+              <a:rPr lang="ko-KR" sz="1800">
+                <a:latin typeface="맑은 고딕" charset="0"/>
+                <a:ea typeface="맑은 고딕" charset="0"/>
+              </a:rPr>
+              <a:t>와 string 변수를 선언합니다.</a:t>
+            </a:r>
+            <a:endParaRPr lang="ko-KR" altLang="en-US" sz="1800">
+              <a:latin typeface="맑은 고딕" charset="0"/>
+              <a:ea typeface="맑은 고딕" charset="0"/>
+            </a:endParaRPr>
+          </a:p>
+        </p:txBody>
+      </p:sp>
+      <p:pic>
+        <p:nvPicPr>
+          <p:cNvPr id="53" name="그림 50" descr="C:/Users/Admin1/AppData/Roaming/PolarisOffice/ETemp/20796_18072784/fImage238462174464.png"/>
+          <p:cNvPicPr>
+            <a:picLocks noChangeAspect="1"/>
+          </p:cNvPicPr>
+          <p:nvPr/>
+        </p:nvPicPr>
+        <p:blipFill rotWithShape="1">
+          <a:blip r:embed="rId12" cstate="print">
+            <a:extLst>
+              <a:ext uri="{28A0092B-C50C-407E-A947-70E740481C1C}">
+                <a14:useLocalDpi xmlns:a14="http://schemas.microsoft.com/office/drawing/2010/main" val="0"/>
+              </a:ext>
+            </a:extLst>
+          </a:blip>
+          <a:stretch>
+            <a:fillRect/>
+          </a:stretch>
+        </p:blipFill>
+        <p:spPr>
+          <a:xfrm rot="0">
+            <a:off x="6824980" y="3886200"/>
+            <a:ext cx="4123690" cy="1301750"/>
+          </a:xfrm>
+          <a:prstGeom prst="roundRect"/>
+          <a:solidFill>
+            <a:srgbClr val="EDEDED"/>
+          </a:solidFill>
+        </p:spPr>
+      </p:pic>
+      <p:sp>
+        <p:nvSpPr>
+          <p:cNvPr id="54" name="텍스트 상자 53"/>
+          <p:cNvSpPr txBox="1">
+            <a:spLocks/>
+          </p:cNvSpPr>
+          <p:nvPr/>
+        </p:nvSpPr>
+        <p:spPr>
+          <a:xfrm rot="0">
+            <a:off x="6805295" y="5316855"/>
+            <a:ext cx="4131945" cy="861695"/>
+          </a:xfrm>
+          <a:prstGeom prst="rect"/>
+          <a:noFill/>
+        </p:spPr>
+        <p:txBody>
+          <a:bodyPr wrap="square" lIns="0" tIns="0" rIns="0" bIns="0" vert="horz" anchor="t">
+            <a:noAutofit/>
+          </a:bodyPr>
+          <a:lstStyle/>
+          <a:p>
+            <a:pPr marL="0" indent="0" rtl="0" algn="l" defTabSz="914400" eaLnBrk="1" latinLnBrk="0" hangingPunct="1">
+              <a:buFontTx/>
+              <a:buNone/>
+            </a:pPr>
+            <a:r>
+              <a:rPr lang="ko-KR" sz="2000" b="1">
+                <a:solidFill>
+                  <a:srgbClr val="0611F2"/>
+                </a:solidFill>
+                <a:latin typeface="맑은 고딕" charset="0"/>
+                <a:ea typeface="맑은 고딕" charset="0"/>
+              </a:rPr>
+              <a:t>1</a:t>
+            </a:r>
+            <a:r>
+              <a:rPr lang="ko-KR" sz="2000" b="1">
+                <a:solidFill>
+                  <a:srgbClr val="0611F2"/>
+                </a:solidFill>
+                <a:latin typeface="맑은 고딕" charset="0"/>
+                <a:ea typeface="맑은 고딕" charset="0"/>
+              </a:rPr>
+              <a:t>2</a:t>
+            </a:r>
+            <a:r>
+              <a:rPr sz="2000" b="1">
+                <a:solidFill>
+                  <a:srgbClr val="0611F2"/>
+                </a:solidFill>
+                <a:latin typeface="맑은 고딕" charset="0"/>
+                <a:ea typeface="맑은 고딕" charset="0"/>
+              </a:rPr>
+              <a:t>. </a:t>
+            </a:r>
+            <a:r>
+              <a:rPr lang="ko-KR" sz="1800">
+                <a:latin typeface="맑은 고딕" charset="0"/>
+                <a:ea typeface="맑은 고딕" charset="0"/>
+              </a:rPr>
+              <a:t>이제</a:t>
+            </a:r>
+            <a:r>
+              <a:rPr lang="ko-KR" sz="1800">
+                <a:latin typeface="맑은 고딕" charset="0"/>
+                <a:ea typeface="맑은 고딕" charset="0"/>
+              </a:rPr>
+              <a:t> SetInfo( ) 함수</a:t>
+            </a:r>
+            <a:r>
+              <a:rPr lang="ko-KR" sz="1800">
+                <a:latin typeface="맑은 고딕" charset="0"/>
+                <a:ea typeface="맑은 고딕" charset="0"/>
+              </a:rPr>
+              <a:t>를 선언하고</a:t>
+            </a:r>
+            <a:r>
+              <a:rPr lang="ko-KR" sz="1800">
+                <a:latin typeface="맑은 고딕" charset="0"/>
+                <a:ea typeface="맑은 고딕" charset="0"/>
+              </a:rPr>
+              <a:t> 룸의 이름과 현재 접속</a:t>
+            </a:r>
+            <a:r>
+              <a:rPr lang="ko-KR" sz="1800">
+                <a:latin typeface="맑은 고딕" charset="0"/>
+                <a:ea typeface="맑은 고딕" charset="0"/>
+              </a:rPr>
+              <a:t>한</a:t>
+            </a:r>
+            <a:r>
+              <a:rPr lang="ko-KR" sz="1800">
+                <a:latin typeface="맑은 고딕" charset="0"/>
+                <a:ea typeface="맑은 고딕" charset="0"/>
+              </a:rPr>
+              <a:t> 인원 수</a:t>
+            </a:r>
+            <a:r>
+              <a:rPr lang="ko-KR" sz="1800">
+                <a:latin typeface="맑은 고딕" charset="0"/>
+                <a:ea typeface="맑은 고딕" charset="0"/>
+              </a:rPr>
+              <a:t>를</a:t>
+            </a:r>
+            <a:r>
+              <a:rPr lang="ko-KR" sz="1800">
+                <a:latin typeface="맑은 고딕" charset="0"/>
+                <a:ea typeface="맑은 고딕" charset="0"/>
+              </a:rPr>
+              <a:t> 표시합니다.</a:t>
+            </a:r>
+            <a:endParaRPr lang="ko-KR" altLang="en-US" sz="1800">
+              <a:latin typeface="맑은 고딕" charset="0"/>
+              <a:ea typeface="맑은 고딕" charset="0"/>
+            </a:endParaRPr>
+          </a:p>
+        </p:txBody>
+      </p:sp>
     </p:spTree>
   </p:cSld>
   <p:clrMapOvr>
@@ -11341,8 +11728,8 @@
         </p:nvSpPr>
         <p:spPr>
           <a:xfrm rot="0">
-            <a:off x="1221740" y="3618865"/>
-            <a:ext cx="4140835" cy="2615565"/>
+            <a:off x="1229995" y="2753360"/>
+            <a:ext cx="4141470" cy="954405"/>
           </a:xfrm>
           <a:prstGeom prst="rect"/>
           <a:noFill/>
@@ -11369,7 +11756,17 @@
                 <a:latin typeface="맑은 고딕" charset="0"/>
                 <a:ea typeface="맑은 고딕" charset="0"/>
               </a:rPr>
-              <a:t>11</a:t>
+              <a:t>1</a:t>
+            </a:r>
+            <a:r>
+              <a:rPr lang="ko-KR" sz="2000" b="1">
+                <a:solidFill>
+                  <a:srgbClr val="0611F2"/>
+                </a:solidFill>
+                <a:latin typeface="맑은 고딕" charset="0"/>
+                <a:ea typeface="맑은 고딕" charset="0"/>
+              </a:rPr>
+              <a:t>3</a:t>
             </a:r>
             <a:r>
               <a:rPr sz="2000" b="1">
@@ -11386,67 +11783,13 @@
                 <a:latin typeface="맑은 고딕" charset="0"/>
                 <a:ea typeface="맑은 고딕" charset="0"/>
               </a:rPr>
-              <a:t>이제 Infomation 스크립트에서 텍스트 변수를 선언합니다.</a:t>
+              <a:t>그런 다음 OnClickJoinRoom( ) 함수를 선언하고 룸에 접속하도록 설정합니다.</a:t>
             </a:r>
             <a:endParaRPr lang="ko-KR" altLang="en-US" sz="1800">
               <a:latin typeface="맑은 고딕" charset="0"/>
               <a:ea typeface="맑은 고딕" charset="0"/>
             </a:endParaRPr>
           </a:p>
-          <a:p>
-            <a:pPr marL="0" indent="0" rtl="0" algn="l" defTabSz="914400" eaLnBrk="1" latinLnBrk="0" hangingPunct="1">
-              <a:buFontTx/>
-              <a:buNone/>
-            </a:pPr>
-            <a:endParaRPr lang="ko-KR" altLang="en-US" sz="1800">
-              <a:latin typeface="맑은 고딕" charset="0"/>
-              <a:ea typeface="맑은 고딕" charset="0"/>
-            </a:endParaRPr>
-          </a:p>
-          <a:p>
-            <a:pPr marL="0" indent="0" rtl="0" algn="l" defTabSz="914400" eaLnBrk="1" latinLnBrk="0" hangingPunct="1">
-              <a:buFontTx/>
-              <a:buNone/>
-            </a:pPr>
-            <a:r>
-              <a:rPr lang="ko-KR" sz="1800">
-                <a:latin typeface="맑은 고딕" charset="0"/>
-                <a:ea typeface="맑은 고딕" charset="0"/>
-              </a:rPr>
-              <a:t>그다음 룸에 대한 정보를 표시하는 SetInfo( ) 함수를 생성합니다.</a:t>
-            </a:r>
-            <a:endParaRPr lang="ko-KR" altLang="en-US" sz="1800">
-              <a:latin typeface="맑은 고딕" charset="0"/>
-              <a:ea typeface="맑은 고딕" charset="0"/>
-            </a:endParaRPr>
-          </a:p>
-          <a:p>
-            <a:pPr marL="0" indent="0" rtl="0" algn="l" defTabSz="914400" eaLnBrk="1" latinLnBrk="0" hangingPunct="1">
-              <a:buFontTx/>
-              <a:buNone/>
-            </a:pPr>
-            <a:endParaRPr lang="ko-KR" altLang="en-US" sz="1800">
-              <a:latin typeface="맑은 고딕" charset="0"/>
-              <a:ea typeface="맑은 고딕" charset="0"/>
-            </a:endParaRPr>
-          </a:p>
-          <a:p>
-            <a:pPr marL="0" indent="0" rtl="0" algn="l" defTabSz="914400" eaLnBrk="1" latinLnBrk="0" hangingPunct="1">
-              <a:buFontTx/>
-              <a:buNone/>
-            </a:pPr>
-            <a:r>
-              <a:rPr lang="ko-KR" sz="1800">
-                <a:latin typeface="맑은 고딕" charset="0"/>
-                <a:ea typeface="맑은 고딕" charset="0"/>
-              </a:rPr>
-              <a:t>SetInfo( ) 함수는 룸의 이름과 현재 접속한 인원 수 그리고 최대로 방에 접속할 수 있는 인원 수를 표시합니다.</a:t>
-            </a:r>
-            <a:endParaRPr lang="ko-KR" altLang="en-US" sz="1800">
-              <a:latin typeface="맑은 고딕" charset="0"/>
-              <a:ea typeface="맑은 고딕" charset="0"/>
-            </a:endParaRPr>
-          </a:p>
         </p:txBody>
       </p:sp>
       <p:sp>
@@ -11459,8 +11802,8 @@
         </p:nvSpPr>
         <p:spPr>
           <a:xfrm rot="0">
-            <a:off x="6800215" y="3897630"/>
-            <a:ext cx="4206875" cy="2338705"/>
+            <a:off x="6824980" y="2808605"/>
+            <a:ext cx="4123690" cy="954405"/>
           </a:xfrm>
           <a:prstGeom prst="rect"/>
           <a:noFill/>
@@ -11487,7 +11830,17 @@
                 <a:latin typeface="맑은 고딕" charset="0"/>
                 <a:ea typeface="맑은 고딕" charset="0"/>
               </a:rPr>
-              <a:t>12</a:t>
+              <a:t>1</a:t>
+            </a:r>
+            <a:r>
+              <a:rPr lang="ko-KR" sz="2000" b="1">
+                <a:solidFill>
+                  <a:srgbClr val="0611F2"/>
+                </a:solidFill>
+                <a:latin typeface="맑은 고딕" charset="0"/>
+                <a:ea typeface="맑은 고딕" charset="0"/>
+              </a:rPr>
+              <a:t>5</a:t>
             </a:r>
             <a:r>
               <a:rPr sz="2000" b="1">
@@ -11504,52 +11857,46 @@
                 <a:latin typeface="맑은 고딕" charset="0"/>
                 <a:ea typeface="맑은 고딕" charset="0"/>
               </a:rPr>
-              <a:t>그런 다음 Room Button의 하위 오브젝트 텍스트의 이름을 Infomation Text로 정의합니다.</a:t>
+              <a:t>그</a:t>
+            </a:r>
+            <a:r>
+              <a:rPr lang="ko-KR" sz="1800">
+                <a:latin typeface="맑은 고딕" charset="0"/>
+                <a:ea typeface="맑은 고딕" charset="0"/>
+              </a:rPr>
+              <a:t>다음으로</a:t>
+            </a:r>
+            <a:r>
+              <a:rPr lang="ko-KR" sz="1800">
+                <a:latin typeface="맑은 고딕" charset="0"/>
+                <a:ea typeface="맑은 고딕" charset="0"/>
+              </a:rPr>
+              <a:t> </a:t>
+            </a:r>
+            <a:r>
+              <a:rPr lang="ko-KR" sz="1800">
+                <a:latin typeface="맑은 고딕" charset="0"/>
+                <a:ea typeface="맑은 고딕" charset="0"/>
+              </a:rPr>
+              <a:t>Room 오브젝트의 앵커를 지정하고 크기와 위치를 설정합니다.</a:t>
             </a:r>
             <a:endParaRPr lang="ko-KR" altLang="en-US" sz="1800">
               <a:latin typeface="맑은 고딕" charset="0"/>
               <a:ea typeface="맑은 고딕" charset="0"/>
             </a:endParaRPr>
           </a:p>
-          <a:p>
-            <a:pPr marL="0" indent="0" rtl="0" algn="l" defTabSz="914400" eaLnBrk="1" latinLnBrk="0" hangingPunct="1">
-              <a:buFontTx/>
-              <a:buNone/>
-            </a:pPr>
-            <a:endParaRPr lang="ko-KR" altLang="en-US" sz="1800">
-              <a:latin typeface="맑은 고딕" charset="0"/>
-              <a:ea typeface="맑은 고딕" charset="0"/>
-            </a:endParaRPr>
-          </a:p>
-          <a:p>
-            <a:pPr marL="0" indent="0" rtl="0" algn="l" defTabSz="914400" eaLnBrk="1" latinLnBrk="0" hangingPunct="1">
-              <a:buFontTx/>
-              <a:buNone/>
-            </a:pPr>
-            <a:r>
-              <a:rPr lang="ko-KR" sz="1800">
-                <a:latin typeface="맑은 고딕" charset="0"/>
-                <a:ea typeface="맑은 고딕" charset="0"/>
-              </a:rPr>
-              <a:t>그리고 Room 오브젝트에 있는 Infomation 스크립트의 Room Data에 Infomation Text 오브젝트를 넣어줍니다.</a:t>
-            </a:r>
-            <a:endParaRPr lang="ko-KR" altLang="en-US" sz="1800">
-              <a:latin typeface="맑은 고딕" charset="0"/>
-              <a:ea typeface="맑은 고딕" charset="0"/>
-            </a:endParaRPr>
-          </a:p>
         </p:txBody>
       </p:sp>
       <p:pic>
         <p:nvPicPr>
-          <p:cNvPr id="44" name="그림 89"/>
+          <p:cNvPr id="47" name="그림 56" descr="C:/Users/Admin1/AppData/Roaming/PolarisOffice/ETemp/20796_18072784/fImage143252195705.png"/>
           <p:cNvPicPr>
             <a:picLocks noChangeAspect="1"/>
           </p:cNvPicPr>
           <p:nvPr/>
         </p:nvPicPr>
         <p:blipFill rotWithShape="1">
-          <a:blip r:embed="rId2" cstate="print">
+          <a:blip r:embed="rId6" cstate="print">
             <a:extLst>
               <a:ext uri="{28A0092B-C50C-407E-A947-70E740481C1C}">
                 <a14:useLocalDpi xmlns:a14="http://schemas.microsoft.com/office/drawing/2010/main" val="0"/>
@@ -11562,8 +11909,8 @@
         </p:blipFill>
         <p:spPr>
           <a:xfrm rot="0">
-            <a:off x="1231900" y="1243330"/>
-            <a:ext cx="4138930" cy="2315210"/>
+            <a:off x="1229995" y="1409700"/>
+            <a:ext cx="4140835" cy="1259205"/>
           </a:xfrm>
           <a:prstGeom prst="roundRect"/>
           <a:solidFill>
@@ -11573,14 +11920,14 @@
       </p:pic>
       <p:pic>
         <p:nvPicPr>
-          <p:cNvPr id="45" name="그림 93"/>
+          <p:cNvPr id="48" name="그림 59" descr="C:/Users/Admin1/AppData/Roaming/PolarisOffice/ETemp/20796_18072784/fImage131212208145.png"/>
           <p:cNvPicPr>
             <a:picLocks noChangeAspect="1"/>
           </p:cNvPicPr>
           <p:nvPr/>
         </p:nvPicPr>
         <p:blipFill rotWithShape="1">
-          <a:blip r:embed="rId3" cstate="print">
+          <a:blip r:embed="rId7" cstate="print">
             <a:extLst>
               <a:ext uri="{28A0092B-C50C-407E-A947-70E740481C1C}">
                 <a14:useLocalDpi xmlns:a14="http://schemas.microsoft.com/office/drawing/2010/main" val="0"/>
@@ -11593,8 +11940,8 @@
         </p:blipFill>
         <p:spPr>
           <a:xfrm rot="0">
-            <a:off x="6800215" y="1243330"/>
-            <a:ext cx="1097915" cy="2531110"/>
+            <a:off x="1226820" y="3815080"/>
+            <a:ext cx="1134745" cy="1330960"/>
           </a:xfrm>
           <a:prstGeom prst="roundRect"/>
           <a:solidFill>
@@ -11604,14 +11951,242 @@
       </p:pic>
       <p:pic>
         <p:nvPicPr>
-          <p:cNvPr id="46" name="그림 99"/>
+          <p:cNvPr id="49" name="그림 61" descr="C:/Users/Admin1/AppData/Roaming/PolarisOffice/ETemp/20796_18072784/fImage65112213281.png"/>
           <p:cNvPicPr>
             <a:picLocks noChangeAspect="1"/>
           </p:cNvPicPr>
           <p:nvPr/>
         </p:nvPicPr>
         <p:blipFill rotWithShape="1">
-          <a:blip r:embed="rId4" cstate="hqprint">
+          <a:blip r:embed="rId8" cstate="print">
+            <a:extLst>
+              <a:ext uri="{28A0092B-C50C-407E-A947-70E740481C1C}">
+                <a14:useLocalDpi xmlns:a14="http://schemas.microsoft.com/office/drawing/2010/main" val="0"/>
+              </a:ext>
+            </a:extLst>
+          </a:blip>
+          <a:stretch>
+            <a:fillRect/>
+          </a:stretch>
+        </p:blipFill>
+        <p:spPr>
+          <a:xfrm rot="0">
+            <a:off x="2477135" y="3823970"/>
+            <a:ext cx="2885440" cy="1330960"/>
+          </a:xfrm>
+          <a:prstGeom prst="roundRect"/>
+          <a:solidFill>
+            <a:srgbClr val="EDEDED"/>
+          </a:solidFill>
+        </p:spPr>
+      </p:pic>
+      <p:sp>
+        <p:nvSpPr>
+          <p:cNvPr id="50" name="텍스트 상자 65"/>
+          <p:cNvSpPr txBox="1">
+            <a:spLocks/>
+          </p:cNvSpPr>
+          <p:nvPr/>
+        </p:nvSpPr>
+        <p:spPr>
+          <a:xfrm rot="0">
+            <a:off x="1227455" y="5283200"/>
+            <a:ext cx="4143375" cy="954405"/>
+          </a:xfrm>
+          <a:prstGeom prst="rect"/>
+          <a:noFill/>
+          <a:ln w="0">
+            <a:noFill/>
+            <a:prstDash/>
+          </a:ln>
+        </p:spPr>
+        <p:txBody>
+          <a:bodyPr wrap="square" lIns="89535" tIns="46355" rIns="89535" bIns="46355" numCol="1" vert="horz" anchor="t">
+            <a:spAutoFit/>
+          </a:bodyPr>
+          <a:lstStyle/>
+          <a:p>
+            <a:pPr marL="0" indent="0" rtl="0" algn="l" defTabSz="914400" eaLnBrk="1" latinLnBrk="0" hangingPunct="1">
+              <a:buFontTx/>
+              <a:buNone/>
+            </a:pPr>
+            <a:r>
+              <a:rPr lang="ko-KR" sz="2000" b="1">
+                <a:solidFill>
+                  <a:srgbClr val="0611F2"/>
+                </a:solidFill>
+                <a:latin typeface="맑은 고딕" charset="0"/>
+                <a:ea typeface="맑은 고딕" charset="0"/>
+              </a:rPr>
+              <a:t>1</a:t>
+            </a:r>
+            <a:r>
+              <a:rPr lang="ko-KR" sz="2000" b="1">
+                <a:solidFill>
+                  <a:srgbClr val="0611F2"/>
+                </a:solidFill>
+                <a:latin typeface="맑은 고딕" charset="0"/>
+                <a:ea typeface="맑은 고딕" charset="0"/>
+              </a:rPr>
+              <a:t>4</a:t>
+            </a:r>
+            <a:r>
+              <a:rPr sz="2000" b="1">
+                <a:solidFill>
+                  <a:srgbClr val="0611F2"/>
+                </a:solidFill>
+                <a:latin typeface="맑은 고딕" charset="0"/>
+                <a:ea typeface="맑은 고딕" charset="0"/>
+              </a:rPr>
+              <a:t>. </a:t>
+            </a:r>
+            <a:r>
+              <a:rPr lang="ko-KR" sz="1800">
+                <a:latin typeface="맑은 고딕" charset="0"/>
+                <a:ea typeface="맑은 고딕" charset="0"/>
+              </a:rPr>
+              <a:t>그리고 Room 오브젝트에 있는 Infomation 스크립트</a:t>
+            </a:r>
+            <a:r>
+              <a:rPr lang="ko-KR" sz="1800">
+                <a:latin typeface="맑은 고딕" charset="0"/>
+                <a:ea typeface="맑은 고딕" charset="0"/>
+              </a:rPr>
+              <a:t>에</a:t>
+            </a:r>
+            <a:r>
+              <a:rPr lang="ko-KR" sz="1800">
+                <a:latin typeface="맑은 고딕" charset="0"/>
+                <a:ea typeface="맑은 고딕" charset="0"/>
+              </a:rPr>
+              <a:t> Room Data</a:t>
+            </a:r>
+            <a:r>
+              <a:rPr lang="ko-KR" sz="1800">
+                <a:latin typeface="맑은 고딕" charset="0"/>
+                <a:ea typeface="맑은 고딕" charset="0"/>
+              </a:rPr>
+              <a:t> 속성에</a:t>
+            </a:r>
+            <a:r>
+              <a:rPr lang="ko-KR" sz="1800">
+                <a:latin typeface="맑은 고딕" charset="0"/>
+                <a:ea typeface="맑은 고딕" charset="0"/>
+              </a:rPr>
+              <a:t> Infomation Text를 넣어줍니다.</a:t>
+            </a:r>
+            <a:endParaRPr lang="ko-KR" altLang="en-US" sz="1800">
+              <a:latin typeface="맑은 고딕" charset="0"/>
+              <a:ea typeface="맑은 고딕" charset="0"/>
+            </a:endParaRPr>
+          </a:p>
+        </p:txBody>
+      </p:sp>
+      <p:cxnSp>
+        <p:nvCxnSpPr>
+          <p:cNvPr id="51" name="도형 66"/>
+          <p:cNvCxnSpPr/>
+          <p:nvPr/>
+        </p:nvCxnSpPr>
+        <p:spPr>
+          <a:xfrm rot="0">
+            <a:off x="2261235" y="4788535"/>
+            <a:ext cx="3001645" cy="33655"/>
+          </a:xfrm>
+          <a:prstGeom prst="straightConnector1"/>
+          <a:ln w="6350" cap="flat" cmpd="sng">
+            <a:prstDash/>
+            <a:headEnd type="none" w="med" len="med"/>
+            <a:tailEnd type="triangle" w="med" len="med"/>
+          </a:ln>
+        </p:spPr>
+        <p:style>
+          <a:lnRef idx="1">
+            <a:schemeClr val="accent1"/>
+          </a:lnRef>
+          <a:fillRef idx="0">
+            <a:schemeClr val="accent1"/>
+          </a:fillRef>
+          <a:effectRef idx="0">
+            <a:schemeClr val="accent1"/>
+          </a:effectRef>
+          <a:fontRef idx="minor">
+            <a:schemeClr val="tx1"/>
+          </a:fontRef>
+        </p:style>
+      </p:cxnSp>
+      <p:pic>
+        <p:nvPicPr>
+          <p:cNvPr id="52" name="그림 67" descr="C:/Users/Admin1/AppData/Roaming/PolarisOffice/ETemp/20796_18072784/fImage114932246827.png"/>
+          <p:cNvPicPr>
+            <a:picLocks noChangeAspect="1"/>
+          </p:cNvPicPr>
+          <p:nvPr/>
+        </p:nvPicPr>
+        <p:blipFill rotWithShape="1">
+          <a:blip r:embed="rId9" cstate="print">
+            <a:extLst>
+              <a:ext uri="{28A0092B-C50C-407E-A947-70E740481C1C}">
+                <a14:useLocalDpi xmlns:a14="http://schemas.microsoft.com/office/drawing/2010/main" val="0"/>
+              </a:ext>
+            </a:extLst>
+          </a:blip>
+          <a:stretch>
+            <a:fillRect/>
+          </a:stretch>
+        </p:blipFill>
+        <p:spPr>
+          <a:xfrm rot="0">
+            <a:off x="6824980" y="1421765"/>
+            <a:ext cx="4132580" cy="1247140"/>
+          </a:xfrm>
+          <a:prstGeom prst="roundRect"/>
+          <a:solidFill>
+            <a:srgbClr val="EDEDED"/>
+          </a:solidFill>
+        </p:spPr>
+      </p:pic>
+      <p:pic>
+        <p:nvPicPr>
+          <p:cNvPr id="53" name="그림 70" descr="C:/Users/Admin1/AppData/Roaming/PolarisOffice/ETemp/20796_18072784/fImage126952259961.png"/>
+          <p:cNvPicPr>
+            <a:picLocks noChangeAspect="1"/>
+          </p:cNvPicPr>
+          <p:nvPr/>
+        </p:nvPicPr>
+        <p:blipFill rotWithShape="1">
+          <a:blip r:embed="rId10" cstate="print">
+            <a:extLst>
+              <a:ext uri="{28A0092B-C50C-407E-A947-70E740481C1C}">
+                <a14:useLocalDpi xmlns:a14="http://schemas.microsoft.com/office/drawing/2010/main" val="0"/>
+              </a:ext>
+            </a:extLst>
+          </a:blip>
+          <a:stretch>
+            <a:fillRect/>
+          </a:stretch>
+        </p:blipFill>
+        <p:spPr>
+          <a:xfrm rot="0">
+            <a:off x="6821170" y="3882390"/>
+            <a:ext cx="1259840" cy="1255395"/>
+          </a:xfrm>
+          <a:prstGeom prst="roundRect"/>
+          <a:solidFill>
+            <a:srgbClr val="EDEDED"/>
+          </a:solidFill>
+        </p:spPr>
+      </p:pic>
+      <p:pic>
+        <p:nvPicPr>
+          <p:cNvPr id="54" name="그림 73" descr="C:/Users/Admin1/AppData/Roaming/PolarisOffice/ETemp/20796_18072784/fImage479118341.png"/>
+          <p:cNvPicPr>
+            <a:picLocks noChangeAspect="1"/>
+          </p:cNvPicPr>
+          <p:nvPr/>
+        </p:nvPicPr>
+        <p:blipFill rotWithShape="1">
+          <a:blip r:embed="rId11" cstate="hqprint">
             <a:extLst>
               <a:ext uri="{28A0092B-C50C-407E-A947-70E740481C1C}">
                 <a14:useLocalDpi xmlns:a14="http://schemas.microsoft.com/office/drawing/2010/main"/>
@@ -11624,13 +12199,103 @@
         </p:blipFill>
         <p:spPr>
           <a:xfrm rot="0">
-            <a:off x="8013700" y="1238885"/>
-            <a:ext cx="3006090" cy="2545080"/>
+            <a:off x="8230235" y="3869690"/>
+            <a:ext cx="2735580" cy="1268730"/>
+          </a:xfrm>
+          <a:prstGeom prst="roundRect"/>
+          <a:solidFill>
+            <a:srgbClr val="EDEDED"/>
+          </a:solidFill>
+        </p:spPr>
+      </p:pic>
+      <p:sp>
+        <p:nvSpPr>
+          <p:cNvPr id="55" name="텍스트 상자 74"/>
+          <p:cNvSpPr txBox="1">
+            <a:spLocks/>
+          </p:cNvSpPr>
+          <p:nvPr/>
+        </p:nvSpPr>
+        <p:spPr>
+          <a:xfrm rot="0">
+            <a:off x="6833235" y="5281295"/>
+            <a:ext cx="4116070" cy="954405"/>
           </a:xfrm>
           <a:prstGeom prst="rect"/>
           <a:noFill/>
-        </p:spPr>
-      </p:pic>
+          <a:ln w="0">
+            <a:noFill/>
+            <a:prstDash/>
+          </a:ln>
+        </p:spPr>
+        <p:txBody>
+          <a:bodyPr wrap="square" lIns="89535" tIns="46355" rIns="89535" bIns="46355" numCol="1" vert="horz" anchor="t">
+            <a:spAutoFit/>
+          </a:bodyPr>
+          <a:lstStyle/>
+          <a:p>
+            <a:pPr marL="0" indent="0" rtl="0" algn="l" defTabSz="914400" eaLnBrk="1" latinLnBrk="0" hangingPunct="1">
+              <a:buFontTx/>
+              <a:buNone/>
+            </a:pPr>
+            <a:r>
+              <a:rPr lang="ko-KR" sz="2000" b="1">
+                <a:solidFill>
+                  <a:srgbClr val="0611F2"/>
+                </a:solidFill>
+                <a:latin typeface="맑은 고딕" charset="0"/>
+                <a:ea typeface="맑은 고딕" charset="0"/>
+              </a:rPr>
+              <a:t>1</a:t>
+            </a:r>
+            <a:r>
+              <a:rPr lang="ko-KR" sz="2000" b="1">
+                <a:solidFill>
+                  <a:srgbClr val="0611F2"/>
+                </a:solidFill>
+                <a:latin typeface="맑은 고딕" charset="0"/>
+                <a:ea typeface="맑은 고딕" charset="0"/>
+              </a:rPr>
+              <a:t>6</a:t>
+            </a:r>
+            <a:r>
+              <a:rPr sz="2000" b="1">
+                <a:solidFill>
+                  <a:srgbClr val="0611F2"/>
+                </a:solidFill>
+                <a:latin typeface="맑은 고딕" charset="0"/>
+                <a:ea typeface="맑은 고딕" charset="0"/>
+              </a:rPr>
+              <a:t>. </a:t>
+            </a:r>
+            <a:r>
+              <a:rPr lang="ko-KR" sz="1800">
+                <a:latin typeface="맑은 고딕" charset="0"/>
+                <a:ea typeface="맑은 고딕" charset="0"/>
+              </a:rPr>
+              <a:t>그</a:t>
+            </a:r>
+            <a:r>
+              <a:rPr lang="ko-KR" sz="1800">
+                <a:latin typeface="맑은 고딕" charset="0"/>
+                <a:ea typeface="맑은 고딕" charset="0"/>
+              </a:rPr>
+              <a:t>러고 나서</a:t>
+            </a:r>
+            <a:r>
+              <a:rPr lang="ko-KR" sz="1800">
+                <a:latin typeface="맑은 고딕" charset="0"/>
+                <a:ea typeface="맑은 고딕" charset="0"/>
+              </a:rPr>
+              <a:t> Room 오브젝트를 Project 폴더에 있는 Prefab 폴더에 넣어줍니다.</a:t>
+            </a:r>
+            <a:endParaRPr lang="ko-KR" altLang="en-US" sz="1800">
+              <a:latin typeface="맑은 고딕" charset="0"/>
+              <a:ea typeface="맑은 고딕" charset="0"/>
+            </a:endParaRPr>
+          </a:p>
+        </p:txBody>
+      </p:sp>
     </p:spTree>
   </p:cSld>
   <p:clrMapOvr>
@@ -11724,7 +12389,7 @@
       </p:sp>
       <p:sp>
         <p:nvSpPr>
-          <p:cNvPr id="24" name="Rect 0"/>
+          <p:cNvPr id="50" name="텍스트 상자 9"/>
           <p:cNvSpPr txBox="1">
             <a:spLocks/>
           </p:cNvSpPr>
@@ -11732,8 +12397,8 @@
         </p:nvSpPr>
         <p:spPr>
           <a:xfrm rot="0">
-            <a:off x="1263650" y="2596515"/>
-            <a:ext cx="4099560" cy="954405"/>
+            <a:off x="1252220" y="4222750"/>
+            <a:ext cx="4100195" cy="2061845"/>
           </a:xfrm>
           <a:prstGeom prst="rect"/>
           <a:noFill/>
@@ -11770,7 +12435,7 @@
                 <a:latin typeface="맑은 고딕" charset="0"/>
                 <a:ea typeface="맑은 고딕" charset="0"/>
               </a:rPr>
-              <a:t>3</a:t>
+              <a:t>7</a:t>
             </a:r>
             <a:r>
               <a:rPr sz="2000" b="1">
@@ -11787,89 +12452,18 @@
                 <a:latin typeface="맑은 고딕" charset="0"/>
                 <a:ea typeface="맑은 고딕" charset="0"/>
               </a:rPr>
-              <a:t>그다음으로 Room 오브젝트를 Project 폴더에 있는 Prefab 폴더에 넣어줍니다.</a:t>
+              <a:t>이제 LobbyManager 스크립트에서 InputField 변수와 Button 변수를 선언합니다.</a:t>
             </a:r>
             <a:endParaRPr lang="ko-KR" altLang="en-US" sz="1800">
               <a:latin typeface="맑은 고딕" charset="0"/>
               <a:ea typeface="맑은 고딕" charset="0"/>
             </a:endParaRPr>
           </a:p>
-        </p:txBody>
-      </p:sp>
-      <p:sp>
-        <p:nvSpPr>
-          <p:cNvPr id="33" name="Rect 0"/>
-          <p:cNvSpPr txBox="1">
-            <a:spLocks/>
-          </p:cNvSpPr>
-          <p:nvPr/>
-        </p:nvSpPr>
-        <p:spPr>
-          <a:xfrm rot="0">
-            <a:off x="6800215" y="3116580"/>
-            <a:ext cx="4207510" cy="3169285"/>
-          </a:xfrm>
-          <a:prstGeom prst="rect"/>
-          <a:noFill/>
-          <a:ln w="0">
-            <a:noFill/>
-            <a:prstDash/>
-          </a:ln>
-        </p:spPr>
-        <p:txBody>
-          <a:bodyPr wrap="square" lIns="89535" tIns="46355" rIns="89535" bIns="46355" numCol="1" vert="horz" anchor="t">
-            <a:spAutoFit/>
-          </a:bodyPr>
-          <a:lstStyle/>
           <a:p>
             <a:pPr marL="0" indent="0" rtl="0" algn="l" defTabSz="914400" eaLnBrk="1" latinLnBrk="0" hangingPunct="1">
               <a:buFontTx/>
               <a:buNone/>
             </a:pPr>
-            <a:r>
-              <a:rPr lang="ko-KR" sz="2000" b="1">
-                <a:solidFill>
-                  <a:srgbClr val="0611F2"/>
-                </a:solidFill>
-                <a:latin typeface="맑은 고딕" charset="0"/>
-                <a:ea typeface="맑은 고딕" charset="0"/>
-              </a:rPr>
-              <a:t>1</a:t>
-            </a:r>
-            <a:r>
-              <a:rPr lang="ko-KR" sz="2000" b="1">
-                <a:solidFill>
-                  <a:srgbClr val="0611F2"/>
-                </a:solidFill>
-                <a:latin typeface="맑은 고딕" charset="0"/>
-                <a:ea typeface="맑은 고딕" charset="0"/>
-              </a:rPr>
-              <a:t>5</a:t>
-            </a:r>
-            <a:r>
-              <a:rPr sz="2000" b="1">
-                <a:solidFill>
-                  <a:srgbClr val="0611F2"/>
-                </a:solidFill>
-                <a:latin typeface="맑은 고딕" charset="0"/>
-                <a:ea typeface="맑은 고딕" charset="0"/>
-              </a:rPr>
-              <a:t>. </a:t>
-            </a:r>
-            <a:r>
-              <a:rPr lang="ko-KR" sz="1800">
-                <a:latin typeface="맑은 고딕" charset="0"/>
-                <a:ea typeface="맑은 고딕" charset="0"/>
-              </a:rPr>
-              <a:t>그런 다음 </a:t>
-            </a:r>
-            <a:r>
-              <a:rPr lang="ko-KR" sz="1800">
-                <a:latin typeface="맑은 고딕" charset="0"/>
-                <a:ea typeface="맑은 고딕" charset="0"/>
-              </a:rPr>
-              <a:t>InputField 변수와 Button 변수를 선언합니다.</a:t>
-            </a:r>
             <a:endParaRPr lang="ko-KR" altLang="en-US" sz="1800">
               <a:latin typeface="맑은 고딕" charset="0"/>
               <a:ea typeface="맑은 고딕" charset="0"/>
@@ -11880,67 +12474,44 @@
               <a:buFontTx/>
               <a:buNone/>
             </a:pPr>
+            <a:r>
+              <a:rPr lang="ko-KR" sz="1800">
+                <a:latin typeface="맑은 고딕" charset="0"/>
+                <a:ea typeface="맑은 고딕" charset="0"/>
+              </a:rPr>
+              <a:t>그리고 룸 오브젝트를 생성하기 위</a:t>
+            </a:r>
+            <a:r>
+              <a:rPr lang="ko-KR" sz="1800">
+                <a:latin typeface="맑은 고딕" charset="0"/>
+                <a:ea typeface="맑은 고딕" charset="0"/>
+              </a:rPr>
+              <a:t>한</a:t>
+            </a:r>
+            <a:r>
+              <a:rPr lang="ko-KR" sz="1800">
+                <a:latin typeface="맑은 고딕" charset="0"/>
+                <a:ea typeface="맑은 고딕" charset="0"/>
+              </a:rPr>
+              <a:t> GameObject 변수와 Transform 변수를 선언합니다.</a:t>
+            </a:r>
             <a:endParaRPr lang="ko-KR" altLang="en-US" sz="1800">
               <a:latin typeface="맑은 고딕" charset="0"/>
               <a:ea typeface="맑은 고딕" charset="0"/>
             </a:endParaRPr>
           </a:p>
-          <a:p>
-            <a:pPr marL="0" indent="0" rtl="0" algn="l" defTabSz="914400" eaLnBrk="1" latinLnBrk="0" hangingPunct="1">
-              <a:buFontTx/>
-              <a:buNone/>
-            </a:pPr>
-            <a:r>
-              <a:rPr lang="ko-KR" sz="1800">
-                <a:latin typeface="맑은 고딕" charset="0"/>
-                <a:ea typeface="맑은 고딕" charset="0"/>
-              </a:rPr>
-              <a:t>그리고 룸 오브젝트를 생성하기 위해 GameObject 변수와 룸의 위치를 설정하기 위한 Transform 변수를 선언합니다.</a:t>
-            </a:r>
-            <a:endParaRPr lang="ko-KR" altLang="en-US" sz="1800">
-              <a:latin typeface="맑은 고딕" charset="0"/>
-              <a:ea typeface="맑은 고딕" charset="0"/>
-            </a:endParaRPr>
-          </a:p>
-          <a:p>
-            <a:pPr marL="0" indent="0" rtl="0" algn="l" defTabSz="914400" eaLnBrk="1" latinLnBrk="0" hangingPunct="1">
-              <a:buFontTx/>
-              <a:buNone/>
-            </a:pPr>
-            <a:endParaRPr lang="ko-KR" altLang="en-US" sz="1800">
-              <a:latin typeface="맑은 고딕" charset="0"/>
-              <a:ea typeface="맑은 고딕" charset="0"/>
-            </a:endParaRPr>
-          </a:p>
-          <a:p>
-            <a:pPr marL="0" indent="0" rtl="0" algn="l" defTabSz="914400" eaLnBrk="1" latinLnBrk="0" hangingPunct="1">
-              <a:buFontTx/>
-              <a:buNone/>
-            </a:pPr>
-            <a:r>
-              <a:rPr lang="ko-KR" sz="1800">
-                <a:latin typeface="맑은 고딕" charset="0"/>
-                <a:ea typeface="맑은 고딕" charset="0"/>
-              </a:rPr>
-              <a:t>마지막으로 룸에 대한 정보를 확인하기 위해 Dictionary를 선언하고 룸의 이름과 룸의 정보를 저장합니다.</a:t>
-            </a:r>
-            <a:endParaRPr lang="ko-KR" altLang="en-US" sz="1800">
-              <a:latin typeface="맑은 고딕" charset="0"/>
-              <a:ea typeface="맑은 고딕" charset="0"/>
-            </a:endParaRPr>
-          </a:p>
         </p:txBody>
       </p:sp>
       <p:pic>
         <p:nvPicPr>
-          <p:cNvPr id="47" name="그림 2"/>
+          <p:cNvPr id="52" name="그림 75" descr="C:/Users/Admin1/AppData/Roaming/PolarisOffice/ETemp/20796_18072784/fImage113005229491.png"/>
           <p:cNvPicPr>
             <a:picLocks noChangeAspect="1"/>
           </p:cNvPicPr>
           <p:nvPr/>
         </p:nvPicPr>
         <p:blipFill rotWithShape="1">
-          <a:blip r:embed="rId2" cstate="print">
+          <a:blip r:embed="rId7" cstate="print">
             <a:extLst>
               <a:ext uri="{28A0092B-C50C-407E-A947-70E740481C1C}">
                 <a14:useLocalDpi xmlns:a14="http://schemas.microsoft.com/office/drawing/2010/main" val="0"/>
@@ -11953,8 +12524,8 @@
         </p:blipFill>
         <p:spPr>
           <a:xfrm rot="0">
-            <a:off x="2884805" y="1251585"/>
-            <a:ext cx="2480945" cy="1268095"/>
+            <a:off x="1266190" y="1430020"/>
+            <a:ext cx="4096385" cy="2685415"/>
           </a:xfrm>
           <a:prstGeom prst="roundRect"/>
           <a:solidFill>
@@ -11964,45 +12535,14 @@
       </p:pic>
       <p:pic>
         <p:nvPicPr>
-          <p:cNvPr id="48" name="그림 5"/>
+          <p:cNvPr id="53" name="그림 84" descr="C:/Users/Admin1/AppData/Roaming/PolarisOffice/ETemp/20796_18072784/fImage275312302995.png"/>
           <p:cNvPicPr>
             <a:picLocks noChangeAspect="1"/>
           </p:cNvPicPr>
           <p:nvPr/>
         </p:nvPicPr>
         <p:blipFill rotWithShape="1">
-          <a:blip r:embed="rId3" cstate="hqprint">
-            <a:extLst>
-              <a:ext uri="{28A0092B-C50C-407E-A947-70E740481C1C}">
-                <a14:useLocalDpi xmlns:a14="http://schemas.microsoft.com/office/drawing/2010/main"/>
-              </a:ext>
-            </a:extLst>
-          </a:blip>
-          <a:stretch>
-            <a:fillRect/>
-          </a:stretch>
-        </p:blipFill>
-        <p:spPr>
-          <a:xfrm rot="0">
-            <a:off x="1263650" y="1247775"/>
-            <a:ext cx="1433195" cy="1271270"/>
-          </a:xfrm>
-          <a:prstGeom prst="roundRect"/>
-          <a:solidFill>
-            <a:srgbClr val="EDEDED"/>
-          </a:solidFill>
-        </p:spPr>
-      </p:pic>
-      <p:pic>
-        <p:nvPicPr>
-          <p:cNvPr id="49" name="그림 6"/>
-          <p:cNvPicPr>
-            <a:picLocks noChangeAspect="1"/>
-          </p:cNvPicPr>
-          <p:nvPr/>
-        </p:nvPicPr>
-        <p:blipFill rotWithShape="1">
-          <a:blip r:embed="rId4" cstate="print">
+          <a:blip r:embed="rId8" cstate="print">
             <a:extLst>
               <a:ext uri="{28A0092B-C50C-407E-A947-70E740481C1C}">
                 <a14:useLocalDpi xmlns:a14="http://schemas.microsoft.com/office/drawing/2010/main" val="0"/>
@@ -12015,8 +12555,8 @@
         </p:blipFill>
         <p:spPr>
           <a:xfrm rot="0">
-            <a:off x="1267460" y="3660775"/>
-            <a:ext cx="4095115" cy="1285875"/>
+            <a:off x="6816725" y="1430020"/>
+            <a:ext cx="4149090" cy="1305560"/>
           </a:xfrm>
           <a:prstGeom prst="roundRect"/>
           <a:solidFill>
@@ -12026,7 +12566,7 @@
       </p:pic>
       <p:sp>
         <p:nvSpPr>
-          <p:cNvPr id="50" name="텍스트 상자 9"/>
+          <p:cNvPr id="54" name="텍스트 상자 87"/>
           <p:cNvSpPr txBox="1">
             <a:spLocks/>
           </p:cNvSpPr>
@@ -12034,8 +12574,8 @@
         </p:nvSpPr>
         <p:spPr>
           <a:xfrm rot="0">
-            <a:off x="1260475" y="5053965"/>
-            <a:ext cx="4099560" cy="1231265"/>
+            <a:off x="6816725" y="2825115"/>
+            <a:ext cx="4140835" cy="954405"/>
           </a:xfrm>
           <a:prstGeom prst="rect"/>
           <a:noFill/>
@@ -12072,7 +12612,7 @@
                 <a:latin typeface="맑은 고딕" charset="0"/>
                 <a:ea typeface="맑은 고딕" charset="0"/>
               </a:rPr>
-              <a:t>4</a:t>
+              <a:t>8</a:t>
             </a:r>
             <a:r>
               <a:rPr sz="2000" b="1">
@@ -12089,7 +12629,35 @@
                 <a:latin typeface="맑은 고딕" charset="0"/>
                 <a:ea typeface="맑은 고딕" charset="0"/>
               </a:rPr>
-              <a:t>이제 LobbyManager 스크립트에서 MonoBehaviourPunCallbacks 클래스를 상속받도록 설정합니다.</a:t>
+              <a:t>그다음 룸의 이름과 룸에 접속할</a:t>
+            </a:r>
+            <a:r>
+              <a:rPr lang="ko-KR" sz="1800">
+                <a:latin typeface="맑은 고딕" charset="0"/>
+                <a:ea typeface="맑은 고딕" charset="0"/>
+              </a:rPr>
+              <a:t> </a:t>
+            </a:r>
+            <a:r>
+              <a:rPr lang="ko-KR" sz="1800">
+                <a:latin typeface="맑은 고딕" charset="0"/>
+                <a:ea typeface="맑은 고딕" charset="0"/>
+              </a:rPr>
+              <a:t>인원을 입력하지 않으면 </a:t>
+            </a:r>
+            <a:r>
+              <a:rPr lang="ko-KR" sz="1800">
+                <a:latin typeface="맑은 고딕" charset="0"/>
+                <a:ea typeface="맑은 고딕" charset="0"/>
+              </a:rPr>
+              <a:t>RoomCreate</a:t>
+            </a:r>
+            <a:r>
+              <a:rPr lang="ko-KR" sz="1800">
+                <a:latin typeface="맑은 고딕" charset="0"/>
+                <a:ea typeface="맑은 고딕" charset="0"/>
+              </a:rPr>
+              <a:t> Button을 비활성화하도록 설정합니다.</a:t>
             </a:r>
             <a:endParaRPr lang="ko-KR" altLang="en-US" sz="1800">
               <a:latin typeface="맑은 고딕" charset="0"/>
@@ -12100,14 +12668,14 @@
       </p:sp>
       <p:pic>
         <p:nvPicPr>
-          <p:cNvPr id="51" name="그림 10"/>
+          <p:cNvPr id="55" name="그림 93" descr="C:/Users/Admin1/AppData/Roaming/PolarisOffice/ETemp/20796_18072784/fImage240822351942.png"/>
           <p:cNvPicPr>
             <a:picLocks noChangeAspect="1"/>
           </p:cNvPicPr>
           <p:nvPr/>
         </p:nvPicPr>
         <p:blipFill rotWithShape="1">
-          <a:blip r:embed="rId5" cstate="print">
+          <a:blip r:embed="rId9" cstate="print">
             <a:extLst>
               <a:ext uri="{28A0092B-C50C-407E-A947-70E740481C1C}">
                 <a14:useLocalDpi xmlns:a14="http://schemas.microsoft.com/office/drawing/2010/main" val="0"/>
@@ -12120,8 +12688,8 @@
         </p:blipFill>
         <p:spPr>
           <a:xfrm rot="0">
-            <a:off x="6800215" y="1256030"/>
-            <a:ext cx="4203065" cy="1695450"/>
+            <a:off x="6808470" y="3935095"/>
+            <a:ext cx="4149090" cy="1335405"/>
           </a:xfrm>
           <a:prstGeom prst="roundRect"/>
           <a:solidFill>
@@ -12129,6 +12697,101 @@
           </a:solidFill>
         </p:spPr>
       </p:pic>
+      <p:sp>
+        <p:nvSpPr>
+          <p:cNvPr id="56" name="텍스트 상자 96"/>
+          <p:cNvSpPr txBox="1">
+            <a:spLocks/>
+          </p:cNvSpPr>
+          <p:nvPr/>
+        </p:nvSpPr>
+        <p:spPr>
+          <a:xfrm rot="0">
+            <a:off x="6805295" y="5333365"/>
+            <a:ext cx="4140835" cy="954405"/>
+          </a:xfrm>
+          <a:prstGeom prst="rect"/>
+          <a:noFill/>
+          <a:ln w="0">
+            <a:noFill/>
+            <a:prstDash/>
+          </a:ln>
+        </p:spPr>
+        <p:txBody>
+          <a:bodyPr wrap="square" lIns="89535" tIns="46355" rIns="89535" bIns="46355" numCol="1" vert="horz" anchor="t">
+            <a:spAutoFit/>
+          </a:bodyPr>
+          <a:lstStyle/>
+          <a:p>
+            <a:pPr marL="0" indent="0" rtl="0" algn="l" defTabSz="914400" eaLnBrk="1" latinLnBrk="0" hangingPunct="1">
+              <a:buFontTx/>
+              <a:buNone/>
+            </a:pPr>
+            <a:r>
+              <a:rPr lang="ko-KR" sz="2000" b="1">
+                <a:solidFill>
+                  <a:srgbClr val="0611F2"/>
+                </a:solidFill>
+                <a:latin typeface="맑은 고딕" charset="0"/>
+                <a:ea typeface="맑은 고딕" charset="0"/>
+              </a:rPr>
+              <a:t>1</a:t>
+            </a:r>
+            <a:r>
+              <a:rPr lang="ko-KR" sz="2000" b="1">
+                <a:solidFill>
+                  <a:srgbClr val="0611F2"/>
+                </a:solidFill>
+                <a:latin typeface="맑은 고딕" charset="0"/>
+                <a:ea typeface="맑은 고딕" charset="0"/>
+              </a:rPr>
+              <a:t>9</a:t>
+            </a:r>
+            <a:r>
+              <a:rPr sz="2000" b="1">
+                <a:solidFill>
+                  <a:srgbClr val="0611F2"/>
+                </a:solidFill>
+                <a:latin typeface="맑은 고딕" charset="0"/>
+                <a:ea typeface="맑은 고딕" charset="0"/>
+              </a:rPr>
+              <a:t>. </a:t>
+            </a:r>
+            <a:r>
+              <a:rPr lang="ko-KR" sz="1800">
+                <a:latin typeface="맑은 고딕" charset="0"/>
+                <a:ea typeface="맑은 고딕" charset="0"/>
+              </a:rPr>
+              <a:t>그</a:t>
+            </a:r>
+            <a:r>
+              <a:rPr lang="ko-KR" sz="1800">
+                <a:latin typeface="맑은 고딕" charset="0"/>
+                <a:ea typeface="맑은 고딕" charset="0"/>
+              </a:rPr>
+              <a:t>런 다음</a:t>
+            </a:r>
+            <a:r>
+              <a:rPr lang="ko-KR" sz="1800">
+                <a:latin typeface="맑은 고딕" charset="0"/>
+                <a:ea typeface="맑은 고딕" charset="0"/>
+              </a:rPr>
+              <a:t> 룸</a:t>
+            </a:r>
+            <a:r>
+              <a:rPr lang="ko-KR" sz="1800">
+                <a:latin typeface="맑은 고딕" charset="0"/>
+                <a:ea typeface="맑은 고딕" charset="0"/>
+              </a:rPr>
+              <a:t>에 입장했을 때 Photon Game 씬으로 이동하도록 설정합니다.</a:t>
+            </a:r>
+            <a:endParaRPr lang="ko-KR" altLang="en-US" sz="1800">
+              <a:latin typeface="맑은 고딕" charset="0"/>
+              <a:ea typeface="맑은 고딕" charset="0"/>
+            </a:endParaRPr>
+          </a:p>
+        </p:txBody>
+      </p:sp>
     </p:spTree>
   </p:cSld>
   <p:clrMapOvr>
@@ -12230,8 +12893,8 @@
         </p:nvSpPr>
         <p:spPr>
           <a:xfrm rot="0">
-            <a:off x="6791960" y="3665220"/>
-            <a:ext cx="4207510" cy="2615565"/>
+            <a:off x="6775450" y="4496435"/>
+            <a:ext cx="4165600" cy="1784985"/>
           </a:xfrm>
           <a:prstGeom prst="rect"/>
           <a:noFill/>
@@ -12258,17 +12921,7 @@
                 <a:latin typeface="맑은 고딕" charset="0"/>
                 <a:ea typeface="맑은 고딕" charset="0"/>
               </a:rPr>
-              <a:t>1</a:t>
-            </a:r>
-            <a:r>
-              <a:rPr lang="ko-KR" sz="2000" b="1">
-                <a:solidFill>
-                  <a:srgbClr val="0611F2"/>
-                </a:solidFill>
-                <a:latin typeface="맑은 고딕" charset="0"/>
-                <a:ea typeface="맑은 고딕" charset="0"/>
-              </a:rPr>
-              <a:t>7</a:t>
+              <a:t>21</a:t>
             </a:r>
             <a:r>
               <a:rPr sz="2000" b="1">
@@ -12285,14 +12938,7 @@
                 <a:latin typeface="맑은 고딕" charset="0"/>
                 <a:ea typeface="맑은 고딕" charset="0"/>
               </a:rPr>
-              <a:t>그런 다음 </a:t>
-            </a:r>
-            <a:r>
-              <a:rPr lang="ko-KR" sz="1800">
-                <a:latin typeface="맑은 고딕" charset="0"/>
-                <a:ea typeface="맑은 고딕" charset="0"/>
-              </a:rPr>
-              <a:t>룸을 생성하는 함수를 선언합니다.</a:t>
+              <a:t>그런 다음 룸을 생성하는 함수를 선언합니다.</a:t>
             </a:r>
             <a:endParaRPr lang="ko-KR" altLang="en-US" sz="1800">
               <a:latin typeface="맑은 고딕" charset="0"/>
@@ -12319,6 +12965,20 @@
                 <a:latin typeface="맑은 고딕" charset="0"/>
                 <a:ea typeface="맑은 고딕" charset="0"/>
               </a:rPr>
+              <a:t>마지막으로</a:t>
+            </a:r>
+            <a:r>
+              <a:rPr lang="ko-KR" sz="1800">
+                <a:latin typeface="맑은 고딕" charset="0"/>
+                <a:ea typeface="맑은 고딕" charset="0"/>
+              </a:rPr>
+              <a:t> </a:t>
+            </a:r>
+            <a:r>
+              <a:rPr lang="ko-KR" sz="1800">
+                <a:latin typeface="맑은 고딕" charset="0"/>
+                <a:ea typeface="맑은 고딕" charset="0"/>
+              </a:rPr>
               <a:t>룸을 생성하기 위해 옵션을 설정하고 룸에 접속할 수 있는 인원수와 룸의 오픈 여부를 설정합니다.</a:t>
             </a:r>
             <a:endParaRPr lang="ko-KR" altLang="en-US" sz="1800">
@@ -12326,146 +12986,18 @@
               <a:ea typeface="맑은 고딕" charset="0"/>
             </a:endParaRPr>
           </a:p>
-          <a:p>
-            <a:pPr marL="0" indent="0" rtl="0" algn="l" defTabSz="914400" eaLnBrk="1" latinLnBrk="0" hangingPunct="1">
-              <a:buFontTx/>
-              <a:buNone/>
-            </a:pPr>
-            <a:endParaRPr lang="ko-KR" altLang="en-US" sz="1800">
-              <a:latin typeface="맑은 고딕" charset="0"/>
-              <a:ea typeface="맑은 고딕" charset="0"/>
-            </a:endParaRPr>
-          </a:p>
-          <a:p>
-            <a:pPr marL="0" indent="0" rtl="0" algn="l" defTabSz="914400" eaLnBrk="1" latinLnBrk="0" hangingPunct="1">
-              <a:buFontTx/>
-              <a:buNone/>
-            </a:pPr>
-            <a:r>
-              <a:rPr lang="ko-KR" sz="1800">
-                <a:latin typeface="맑은 고딕" charset="0"/>
-                <a:ea typeface="맑은 고딕" charset="0"/>
-              </a:rPr>
-              <a:t>마지막으로 로비에서 현재 룸에 대한 노출 여부를 설정합니다.</a:t>
-            </a:r>
-            <a:endParaRPr lang="ko-KR" altLang="en-US" sz="1800">
-              <a:latin typeface="맑은 고딕" charset="0"/>
-              <a:ea typeface="맑은 고딕" charset="0"/>
-            </a:endParaRPr>
-          </a:p>
-        </p:txBody>
-      </p:sp>
-      <p:sp>
-        <p:nvSpPr>
-          <p:cNvPr id="50" name="Rect 0"/>
-          <p:cNvSpPr txBox="1">
-            <a:spLocks/>
-          </p:cNvSpPr>
-          <p:nvPr/>
-        </p:nvSpPr>
-        <p:spPr>
-          <a:xfrm rot="0">
-            <a:off x="1285240" y="3665855"/>
-            <a:ext cx="4102100" cy="2615565"/>
-          </a:xfrm>
-          <a:prstGeom prst="rect"/>
-          <a:noFill/>
-          <a:ln w="0">
-            <a:noFill/>
-            <a:prstDash/>
-          </a:ln>
-        </p:spPr>
-        <p:txBody>
-          <a:bodyPr wrap="square" lIns="89535" tIns="46355" rIns="89535" bIns="46355" numCol="1" vert="horz" anchor="t">
-            <a:spAutoFit/>
-          </a:bodyPr>
-          <a:lstStyle/>
-          <a:p>
-            <a:pPr marL="0" indent="0" rtl="0" algn="l" defTabSz="914400" eaLnBrk="1" latinLnBrk="0" hangingPunct="1">
-              <a:buFontTx/>
-              <a:buNone/>
-            </a:pPr>
-            <a:r>
-              <a:rPr lang="ko-KR" sz="2000" b="1">
-                <a:solidFill>
-                  <a:srgbClr val="0611F2"/>
-                </a:solidFill>
-                <a:latin typeface="맑은 고딕" charset="0"/>
-                <a:ea typeface="맑은 고딕" charset="0"/>
-              </a:rPr>
-              <a:t>1</a:t>
-            </a:r>
-            <a:r>
-              <a:rPr lang="ko-KR" sz="2000" b="1">
-                <a:solidFill>
-                  <a:srgbClr val="0611F2"/>
-                </a:solidFill>
-                <a:latin typeface="맑은 고딕" charset="0"/>
-                <a:ea typeface="맑은 고딕" charset="0"/>
-              </a:rPr>
-              <a:t>6</a:t>
-            </a:r>
-            <a:r>
-              <a:rPr sz="2000" b="1">
-                <a:solidFill>
-                  <a:srgbClr val="0611F2"/>
-                </a:solidFill>
-                <a:latin typeface="맑은 고딕" charset="0"/>
-                <a:ea typeface="맑은 고딕" charset="0"/>
-              </a:rPr>
-              <a:t>. </a:t>
-            </a:r>
-            <a:r>
-              <a:rPr lang="ko-KR" sz="1800">
-                <a:latin typeface="맑은 고딕" charset="0"/>
-                <a:ea typeface="맑은 고딕" charset="0"/>
-              </a:rPr>
-              <a:t>이제 Update( ) 함수에서 룸의 이름을 입력하지 않으면 룸에 참가하는 Button을 비활성화하도록 설정합니다.</a:t>
-            </a:r>
-            <a:endParaRPr lang="ko-KR" altLang="en-US" sz="1800">
-              <a:latin typeface="맑은 고딕" charset="0"/>
-              <a:ea typeface="맑은 고딕" charset="0"/>
-            </a:endParaRPr>
-          </a:p>
-          <a:p>
-            <a:pPr marL="0" indent="0" rtl="0" algn="l" defTabSz="914400" eaLnBrk="1" latinLnBrk="0" hangingPunct="1">
-              <a:buFontTx/>
-              <a:buNone/>
-            </a:pPr>
-            <a:endParaRPr lang="ko-KR" altLang="en-US" sz="1800">
-              <a:latin typeface="맑은 고딕" charset="0"/>
-              <a:ea typeface="맑은 고딕" charset="0"/>
-            </a:endParaRPr>
-          </a:p>
-          <a:p>
-            <a:pPr marL="0" indent="0" rtl="0" algn="l" defTabSz="914400" eaLnBrk="1" latinLnBrk="0" hangingPunct="1">
-              <a:buFontTx/>
-              <a:buNone/>
-            </a:pPr>
-            <a:r>
-              <a:rPr lang="ko-KR" sz="1800">
-                <a:latin typeface="맑은 고딕" charset="0"/>
-                <a:ea typeface="맑은 고딕" charset="0"/>
-              </a:rPr>
-              <a:t>그다음으로 룸의 이름과 룸에 접속할 수 있는 인원을 입력하지 않으면 룸을 생성하는 Button을 비활성화하도록 설정합니다.</a:t>
-            </a:r>
-            <a:endParaRPr lang="ko-KR" altLang="en-US" sz="1800">
-              <a:latin typeface="맑은 고딕" charset="0"/>
-              <a:ea typeface="맑은 고딕" charset="0"/>
-            </a:endParaRPr>
-          </a:p>
         </p:txBody>
       </p:sp>
       <p:pic>
         <p:nvPicPr>
-          <p:cNvPr id="52" name="그림 13"/>
+          <p:cNvPr id="54" name="그림 90" descr="C:/Users/Admin1/AppData/Roaming/PolarisOffice/ETemp/20796_18072784/fImage446212344827.png"/>
           <p:cNvPicPr>
             <a:picLocks noChangeAspect="1"/>
           </p:cNvPicPr>
           <p:nvPr/>
         </p:nvPicPr>
         <p:blipFill rotWithShape="1">
-          <a:blip r:embed="rId2" cstate="print">
+          <a:blip r:embed="rId5" cstate="print">
             <a:extLst>
               <a:ext uri="{28A0092B-C50C-407E-A947-70E740481C1C}">
                 <a14:useLocalDpi xmlns:a14="http://schemas.microsoft.com/office/drawing/2010/main" val="0"/>
@@ -12478,23 +13010,155 @@
         </p:blipFill>
         <p:spPr>
           <a:xfrm rot="0">
-            <a:off x="1285875" y="1256665"/>
-            <a:ext cx="4101465" cy="2285365"/>
+            <a:off x="1238885" y="1438275"/>
+            <a:ext cx="4123690" cy="1878965"/>
           </a:xfrm>
           <a:prstGeom prst="rect"/>
           <a:noFill/>
         </p:spPr>
       </p:pic>
+      <p:sp>
+        <p:nvSpPr>
+          <p:cNvPr id="55" name="텍스트 상자 97"/>
+          <p:cNvSpPr txBox="1">
+            <a:spLocks/>
+          </p:cNvSpPr>
+          <p:nvPr/>
+        </p:nvSpPr>
+        <p:spPr>
+          <a:xfrm rot="0">
+            <a:off x="1230630" y="3395980"/>
+            <a:ext cx="4123690" cy="2892425"/>
+          </a:xfrm>
+          <a:prstGeom prst="rect"/>
+          <a:noFill/>
+          <a:ln w="0">
+            <a:noFill/>
+            <a:prstDash/>
+          </a:ln>
+        </p:spPr>
+        <p:txBody>
+          <a:bodyPr wrap="square" lIns="89535" tIns="46355" rIns="89535" bIns="46355" numCol="1" vert="horz" anchor="t">
+            <a:spAutoFit/>
+          </a:bodyPr>
+          <a:lstStyle/>
+          <a:p>
+            <a:pPr marL="0" indent="0" rtl="0" algn="l" defTabSz="914400" eaLnBrk="1" latinLnBrk="0" hangingPunct="1">
+              <a:buFontTx/>
+              <a:buNone/>
+            </a:pPr>
+            <a:r>
+              <a:rPr lang="ko-KR" sz="2000" b="1">
+                <a:solidFill>
+                  <a:srgbClr val="0611F2"/>
+                </a:solidFill>
+                <a:latin typeface="맑은 고딕" charset="0"/>
+                <a:ea typeface="맑은 고딕" charset="0"/>
+              </a:rPr>
+              <a:t>20</a:t>
+            </a:r>
+            <a:r>
+              <a:rPr sz="2000" b="1">
+                <a:solidFill>
+                  <a:srgbClr val="0611F2"/>
+                </a:solidFill>
+                <a:latin typeface="맑은 고딕" charset="0"/>
+                <a:ea typeface="맑은 고딕" charset="0"/>
+              </a:rPr>
+              <a:t>. </a:t>
+            </a:r>
+            <a:r>
+              <a:rPr lang="ko-KR" sz="1800">
+                <a:latin typeface="맑은 고딕" charset="0"/>
+                <a:ea typeface="맑은 고딕" charset="0"/>
+              </a:rPr>
+              <a:t>이제</a:t>
+            </a:r>
+            <a:r>
+              <a:rPr lang="ko-KR" sz="1800">
+                <a:latin typeface="맑은 고딕" charset="0"/>
+                <a:ea typeface="맑은 고딕" charset="0"/>
+              </a:rPr>
+              <a:t> </a:t>
+            </a:r>
+            <a:r>
+              <a:rPr lang="ko-KR" sz="1800">
+                <a:latin typeface="맑은 고딕" charset="0"/>
+                <a:ea typeface="맑은 고딕" charset="0"/>
+              </a:rPr>
+              <a:t>NickNameSetting( ) 함수를 선언합니다.</a:t>
+            </a:r>
+            <a:endParaRPr lang="ko-KR" altLang="en-US" sz="1800">
+              <a:latin typeface="맑은 고딕" charset="0"/>
+              <a:ea typeface="맑은 고딕" charset="0"/>
+            </a:endParaRPr>
+          </a:p>
+          <a:p>
+            <a:pPr marL="0" indent="0" rtl="0" algn="l" defTabSz="914400" eaLnBrk="1" latinLnBrk="0" hangingPunct="1">
+              <a:buFontTx/>
+              <a:buNone/>
+            </a:pPr>
+            <a:endParaRPr lang="ko-KR" altLang="en-US" sz="1800">
+              <a:latin typeface="맑은 고딕" charset="0"/>
+              <a:ea typeface="맑은 고딕" charset="0"/>
+            </a:endParaRPr>
+          </a:p>
+          <a:p>
+            <a:pPr marL="0" indent="0" rtl="0" algn="l" defTabSz="914400" eaLnBrk="1" latinLnBrk="0" hangingPunct="1">
+              <a:buFontTx/>
+              <a:buNone/>
+            </a:pPr>
+            <a:r>
+              <a:rPr lang="ko-KR" sz="1800">
+                <a:latin typeface="맑은 고딕" charset="0"/>
+                <a:ea typeface="맑은 고딕" charset="0"/>
+              </a:rPr>
+              <a:t>그리고 PhotonNetwork의 이름을 설정한 다음 PlayerPrefs로 이름을 저장합니다.</a:t>
+            </a:r>
+            <a:endParaRPr lang="ko-KR" altLang="en-US" sz="1800">
+              <a:latin typeface="맑은 고딕" charset="0"/>
+              <a:ea typeface="맑은 고딕" charset="0"/>
+            </a:endParaRPr>
+          </a:p>
+          <a:p>
+            <a:pPr marL="0" indent="0" rtl="0" algn="l" defTabSz="914400" eaLnBrk="1" latinLnBrk="0" hangingPunct="1">
+              <a:buFontTx/>
+              <a:buNone/>
+            </a:pPr>
+            <a:endParaRPr lang="ko-KR" altLang="en-US" sz="1800">
+              <a:latin typeface="맑은 고딕" charset="0"/>
+              <a:ea typeface="맑은 고딕" charset="0"/>
+            </a:endParaRPr>
+          </a:p>
+          <a:p>
+            <a:pPr marL="0" indent="0" rtl="0" algn="l" defTabSz="914400" eaLnBrk="1" latinLnBrk="0" hangingPunct="1">
+              <a:buFontTx/>
+              <a:buNone/>
+            </a:pPr>
+            <a:r>
+              <a:rPr lang="ko-KR" sz="1800">
+                <a:latin typeface="맑은 고딕" charset="0"/>
+                <a:ea typeface="맑은 고딕" charset="0"/>
+              </a:rPr>
+              <a:t>그다음으로 PhotonNetwork의 이름이 있다면 namePanel 오브젝트를 비활성화하도록 설정합니다.</a:t>
+            </a:r>
+            <a:endParaRPr lang="ko-KR" altLang="en-US" sz="1800">
+              <a:latin typeface="맑은 고딕" charset="0"/>
+              <a:ea typeface="맑은 고딕" charset="0"/>
+            </a:endParaRPr>
+          </a:p>
+        </p:txBody>
+      </p:sp>
       <p:pic>
         <p:nvPicPr>
-          <p:cNvPr id="53" name="그림 15"/>
+          <p:cNvPr id="56" name="그림 100" descr="C:/Users/Admin1/AppData/Roaming/PolarisOffice/ETemp/20796_18072784/fImage642372385436.png"/>
           <p:cNvPicPr>
             <a:picLocks noChangeAspect="1"/>
           </p:cNvPicPr>
           <p:nvPr/>
         </p:nvPicPr>
         <p:blipFill rotWithShape="1">
-          <a:blip r:embed="rId3" cstate="print">
+          <a:blip r:embed="rId6" cstate="print">
             <a:extLst>
               <a:ext uri="{28A0092B-C50C-407E-A947-70E740481C1C}">
                 <a14:useLocalDpi xmlns:a14="http://schemas.microsoft.com/office/drawing/2010/main" val="0"/>
@@ -12507,8 +13171,8 @@
         </p:blipFill>
         <p:spPr>
           <a:xfrm rot="0">
-            <a:off x="6800215" y="1255395"/>
-            <a:ext cx="4203065" cy="2278380"/>
+            <a:off x="6783705" y="1446530"/>
+            <a:ext cx="4164965" cy="2868295"/>
           </a:xfrm>
           <a:prstGeom prst="rect"/>
           <a:noFill/>
@@ -12605,263 +13269,6 @@
           </a:p>
         </p:txBody>
       </p:sp>
-      <p:sp>
-        <p:nvSpPr>
-          <p:cNvPr id="33" name="Rect 0"/>
-          <p:cNvSpPr txBox="1">
-            <a:spLocks/>
-          </p:cNvSpPr>
-          <p:nvPr/>
-        </p:nvSpPr>
-        <p:spPr>
-          <a:xfrm rot="0">
-            <a:off x="6816725" y="4488180"/>
-            <a:ext cx="4173855" cy="1784985"/>
-          </a:xfrm>
-          <a:prstGeom prst="rect"/>
-          <a:noFill/>
-          <a:ln w="0">
-            <a:noFill/>
-            <a:prstDash/>
-          </a:ln>
-        </p:spPr>
-        <p:txBody>
-          <a:bodyPr wrap="square" lIns="89535" tIns="46355" rIns="89535" bIns="46355" numCol="1" vert="horz" anchor="t">
-            <a:spAutoFit/>
-          </a:bodyPr>
-          <a:lstStyle/>
-          <a:p>
-            <a:pPr marL="0" indent="0" rtl="0" algn="l" defTabSz="914400" eaLnBrk="1" latinLnBrk="0" hangingPunct="1">
-              <a:buFontTx/>
-              <a:buNone/>
-            </a:pPr>
-            <a:r>
-              <a:rPr lang="ko-KR" sz="2000" b="1">
-                <a:solidFill>
-                  <a:srgbClr val="0611F2"/>
-                </a:solidFill>
-                <a:latin typeface="맑은 고딕" charset="0"/>
-                <a:ea typeface="맑은 고딕" charset="0"/>
-              </a:rPr>
-              <a:t>19</a:t>
-            </a:r>
-            <a:r>
-              <a:rPr sz="2000" b="1">
-                <a:solidFill>
-                  <a:srgbClr val="0611F2"/>
-                </a:solidFill>
-                <a:latin typeface="맑은 고딕" charset="0"/>
-                <a:ea typeface="맑은 고딕" charset="0"/>
-              </a:rPr>
-              <a:t>. </a:t>
-            </a:r>
-            <a:r>
-              <a:rPr lang="ko-KR" sz="1800">
-                <a:latin typeface="맑은 고딕" charset="0"/>
-                <a:ea typeface="맑은 고딕" charset="0"/>
-              </a:rPr>
-              <a:t>그런 다음 </a:t>
-            </a:r>
-            <a:r>
-              <a:rPr lang="ko-KR" sz="1800">
-                <a:latin typeface="맑은 고딕" charset="0"/>
-                <a:ea typeface="맑은 고딕" charset="0"/>
-              </a:rPr>
-              <a:t>반복문으로 룸의 위치를 확인하고 룸을 전체적으로 삭제하는 함수를 선언합니다.</a:t>
-            </a:r>
-            <a:endParaRPr lang="ko-KR" altLang="en-US" sz="1800">
-              <a:latin typeface="맑은 고딕" charset="0"/>
-              <a:ea typeface="맑은 고딕" charset="0"/>
-            </a:endParaRPr>
-          </a:p>
-          <a:p>
-            <a:pPr marL="0" indent="0" rtl="0" algn="l" defTabSz="914400" eaLnBrk="1" latinLnBrk="0" hangingPunct="1">
-              <a:buFontTx/>
-              <a:buNone/>
-            </a:pPr>
-            <a:endParaRPr lang="ko-KR" altLang="en-US" sz="1800">
-              <a:latin typeface="맑은 고딕" charset="0"/>
-              <a:ea typeface="맑은 고딕" charset="0"/>
-            </a:endParaRPr>
-          </a:p>
-          <a:p>
-            <a:pPr marL="0" indent="0" rtl="0" algn="l" defTabSz="914400" eaLnBrk="1" latinLnBrk="0" hangingPunct="1">
-              <a:buFontTx/>
-              <a:buNone/>
-            </a:pPr>
-            <a:r>
-              <a:rPr lang="ko-KR" sz="1800">
-                <a:latin typeface="맑은 고딕" charset="0"/>
-                <a:ea typeface="맑은 고딕" charset="0"/>
-              </a:rPr>
-              <a:t>이제 룸에 입장했을 때 Phton Game 씬으로 넘어가는 함수를 선언합니다.</a:t>
-            </a:r>
-            <a:endParaRPr lang="ko-KR" altLang="en-US" sz="1800">
-              <a:latin typeface="맑은 고딕" charset="0"/>
-              <a:ea typeface="맑은 고딕" charset="0"/>
-            </a:endParaRPr>
-          </a:p>
-        </p:txBody>
-      </p:sp>
-      <p:sp>
-        <p:nvSpPr>
-          <p:cNvPr id="50" name="Rect 0"/>
-          <p:cNvSpPr txBox="1">
-            <a:spLocks/>
-          </p:cNvSpPr>
-          <p:nvPr/>
-        </p:nvSpPr>
-        <p:spPr>
-          <a:xfrm rot="0">
-            <a:off x="1285240" y="3940175"/>
-            <a:ext cx="4102100" cy="2338705"/>
-          </a:xfrm>
-          <a:prstGeom prst="rect"/>
-          <a:noFill/>
-          <a:ln w="0">
-            <a:noFill/>
-            <a:prstDash/>
-          </a:ln>
-        </p:spPr>
-        <p:txBody>
-          <a:bodyPr wrap="square" lIns="89535" tIns="46355" rIns="89535" bIns="46355" numCol="1" vert="horz" anchor="t">
-            <a:spAutoFit/>
-          </a:bodyPr>
-          <a:lstStyle/>
-          <a:p>
-            <a:pPr marL="0" indent="0" rtl="0" algn="l" defTabSz="914400" eaLnBrk="1" latinLnBrk="0" hangingPunct="1">
-              <a:buFontTx/>
-              <a:buNone/>
-            </a:pPr>
-            <a:r>
-              <a:rPr lang="ko-KR" sz="2000" b="1">
-                <a:solidFill>
-                  <a:srgbClr val="0611F2"/>
-                </a:solidFill>
-                <a:latin typeface="맑은 고딕" charset="0"/>
-                <a:ea typeface="맑은 고딕" charset="0"/>
-              </a:rPr>
-              <a:t>1</a:t>
-            </a:r>
-            <a:r>
-              <a:rPr lang="ko-KR" sz="2000" b="1">
-                <a:solidFill>
-                  <a:srgbClr val="0611F2"/>
-                </a:solidFill>
-                <a:latin typeface="맑은 고딕" charset="0"/>
-                <a:ea typeface="맑은 고딕" charset="0"/>
-              </a:rPr>
-              <a:t>8</a:t>
-            </a:r>
-            <a:r>
-              <a:rPr sz="2000" b="1">
-                <a:solidFill>
-                  <a:srgbClr val="0611F2"/>
-                </a:solidFill>
-                <a:latin typeface="맑은 고딕" charset="0"/>
-                <a:ea typeface="맑은 고딕" charset="0"/>
-              </a:rPr>
-              <a:t>. </a:t>
-            </a:r>
-            <a:r>
-              <a:rPr lang="ko-KR" sz="1800">
-                <a:latin typeface="맑은 고딕" charset="0"/>
-                <a:ea typeface="맑은 고딕" charset="0"/>
-              </a:rPr>
-              <a:t>그리고 룸의 이름을 입력하고 룸에 참가하는 함수를 선언한 다음 룸이 생성되었을 때 호출되는 함수를 선언합니다.</a:t>
-            </a:r>
-            <a:endParaRPr lang="ko-KR" altLang="en-US" sz="1800">
-              <a:latin typeface="맑은 고딕" charset="0"/>
-              <a:ea typeface="맑은 고딕" charset="0"/>
-            </a:endParaRPr>
-          </a:p>
-          <a:p>
-            <a:pPr marL="0" indent="0" rtl="0" algn="l" defTabSz="914400" eaLnBrk="1" latinLnBrk="0" hangingPunct="1">
-              <a:buFontTx/>
-              <a:buNone/>
-            </a:pPr>
-            <a:endParaRPr lang="ko-KR" altLang="en-US" sz="1800">
-              <a:latin typeface="맑은 고딕" charset="0"/>
-              <a:ea typeface="맑은 고딕" charset="0"/>
-            </a:endParaRPr>
-          </a:p>
-          <a:p>
-            <a:pPr marL="0" indent="0" rtl="0" algn="l" defTabSz="914400" eaLnBrk="1" latinLnBrk="0" hangingPunct="1">
-              <a:buFontTx/>
-              <a:buNone/>
-            </a:pPr>
-            <a:r>
-              <a:rPr lang="ko-KR" sz="1800">
-                <a:latin typeface="맑은 고딕" charset="0"/>
-                <a:ea typeface="맑은 고딕" charset="0"/>
-              </a:rPr>
-              <a:t>그다음 룸이 정상적으로 생성되었다면 Debug.Log( )에 Created Room이라는 로그를 출력하도록 설정합니다.</a:t>
-            </a:r>
-            <a:endParaRPr lang="ko-KR" altLang="en-US" sz="1800">
-              <a:latin typeface="맑은 고딕" charset="0"/>
-              <a:ea typeface="맑은 고딕" charset="0"/>
-            </a:endParaRPr>
-          </a:p>
-        </p:txBody>
-      </p:sp>
-      <p:pic>
-        <p:nvPicPr>
-          <p:cNvPr id="54" name="그림 16"/>
-          <p:cNvPicPr>
-            <a:picLocks noChangeAspect="1"/>
-          </p:cNvPicPr>
-          <p:nvPr/>
-        </p:nvPicPr>
-        <p:blipFill rotWithShape="1">
-          <a:blip r:embed="rId2" cstate="print">
-            <a:extLst>
-              <a:ext uri="{28A0092B-C50C-407E-A947-70E740481C1C}">
-                <a14:useLocalDpi xmlns:a14="http://schemas.microsoft.com/office/drawing/2010/main" val="0"/>
-              </a:ext>
-            </a:extLst>
-          </a:blip>
-          <a:stretch>
-            <a:fillRect/>
-          </a:stretch>
-        </p:blipFill>
-        <p:spPr>
-          <a:xfrm rot="0">
-            <a:off x="1287780" y="1256665"/>
-            <a:ext cx="4099560" cy="2501265"/>
-          </a:xfrm>
-          <a:prstGeom prst="rect"/>
-          <a:noFill/>
-        </p:spPr>
-      </p:pic>
-      <p:pic>
-        <p:nvPicPr>
-          <p:cNvPr id="55" name="그림 17"/>
-          <p:cNvPicPr>
-            <a:picLocks noChangeAspect="1"/>
-          </p:cNvPicPr>
-          <p:nvPr/>
-        </p:nvPicPr>
-        <p:blipFill rotWithShape="1">
-          <a:blip r:embed="rId3" cstate="print">
-            <a:extLst>
-              <a:ext uri="{28A0092B-C50C-407E-A947-70E740481C1C}">
-                <a14:useLocalDpi xmlns:a14="http://schemas.microsoft.com/office/drawing/2010/main" val="0"/>
-              </a:ext>
-            </a:extLst>
-          </a:blip>
-          <a:stretch>
-            <a:fillRect/>
-          </a:stretch>
-        </p:blipFill>
-        <p:spPr>
-          <a:xfrm rot="0">
-            <a:off x="6816725" y="1251585"/>
-            <a:ext cx="4173855" cy="3154680"/>
-          </a:xfrm>
-          <a:prstGeom prst="rect"/>
-          <a:noFill/>
-        </p:spPr>
-      </p:pic>
     </p:spTree>
   </p:cSld>
   <p:clrMapOvr>

</xml_diff>